<commit_message>
Add work in progress graphic
</commit_message>
<xml_diff>
--- a/doc/work_in_progress.pptx
+++ b/doc/work_in_progress.pptx
@@ -2,19 +2,18 @@
 <file path=ppt/presentation.xml><?xml version="1.0" encoding="utf-8"?>
 <p:presentation xmlns:a="http://schemas.openxmlformats.org/drawingml/2006/main" xmlns:r="http://schemas.openxmlformats.org/officeDocument/2006/relationships" xmlns:p="http://schemas.openxmlformats.org/presentationml/2006/main" saveSubsetFonts="1">
   <p:sldMasterIdLst>
-    <p:sldMasterId id="2147483648" r:id="rId1"/>
+    <p:sldMasterId id="2147483732" r:id="rId1"/>
   </p:sldMasterIdLst>
   <p:sldIdLst>
-    <p:sldId id="256" r:id="rId2"/>
-    <p:sldId id="257" r:id="rId3"/>
+    <p:sldId id="257" r:id="rId2"/>
   </p:sldIdLst>
-  <p:sldSz cx="12192000" cy="6858000"/>
+  <p:sldSz cx="4937125" cy="3017838"/>
   <p:notesSz cx="6858000" cy="9144000"/>
   <p:defaultTextStyle>
     <a:defPPr>
       <a:defRPr lang="en-US"/>
     </a:defPPr>
-    <a:lvl1pPr marL="0" algn="l" defTabSz="914400" rtl="0" eaLnBrk="1" latinLnBrk="0" hangingPunct="1">
+    <a:lvl1pPr marL="0" algn="l" defTabSz="457200" rtl="0" eaLnBrk="1" latinLnBrk="0" hangingPunct="1">
       <a:defRPr sz="1800" kern="1200">
         <a:solidFill>
           <a:schemeClr val="tx1"/>
@@ -24,7 +23,7 @@
         <a:cs typeface="+mn-cs"/>
       </a:defRPr>
     </a:lvl1pPr>
-    <a:lvl2pPr marL="457200" algn="l" defTabSz="914400" rtl="0" eaLnBrk="1" latinLnBrk="0" hangingPunct="1">
+    <a:lvl2pPr marL="457200" algn="l" defTabSz="457200" rtl="0" eaLnBrk="1" latinLnBrk="0" hangingPunct="1">
       <a:defRPr sz="1800" kern="1200">
         <a:solidFill>
           <a:schemeClr val="tx1"/>
@@ -34,7 +33,7 @@
         <a:cs typeface="+mn-cs"/>
       </a:defRPr>
     </a:lvl2pPr>
-    <a:lvl3pPr marL="914400" algn="l" defTabSz="914400" rtl="0" eaLnBrk="1" latinLnBrk="0" hangingPunct="1">
+    <a:lvl3pPr marL="914400" algn="l" defTabSz="457200" rtl="0" eaLnBrk="1" latinLnBrk="0" hangingPunct="1">
       <a:defRPr sz="1800" kern="1200">
         <a:solidFill>
           <a:schemeClr val="tx1"/>
@@ -44,7 +43,7 @@
         <a:cs typeface="+mn-cs"/>
       </a:defRPr>
     </a:lvl3pPr>
-    <a:lvl4pPr marL="1371600" algn="l" defTabSz="914400" rtl="0" eaLnBrk="1" latinLnBrk="0" hangingPunct="1">
+    <a:lvl4pPr marL="1371600" algn="l" defTabSz="457200" rtl="0" eaLnBrk="1" latinLnBrk="0" hangingPunct="1">
       <a:defRPr sz="1800" kern="1200">
         <a:solidFill>
           <a:schemeClr val="tx1"/>
@@ -54,7 +53,7 @@
         <a:cs typeface="+mn-cs"/>
       </a:defRPr>
     </a:lvl4pPr>
-    <a:lvl5pPr marL="1828800" algn="l" defTabSz="914400" rtl="0" eaLnBrk="1" latinLnBrk="0" hangingPunct="1">
+    <a:lvl5pPr marL="1828800" algn="l" defTabSz="457200" rtl="0" eaLnBrk="1" latinLnBrk="0" hangingPunct="1">
       <a:defRPr sz="1800" kern="1200">
         <a:solidFill>
           <a:schemeClr val="tx1"/>
@@ -64,7 +63,7 @@
         <a:cs typeface="+mn-cs"/>
       </a:defRPr>
     </a:lvl5pPr>
-    <a:lvl6pPr marL="2286000" algn="l" defTabSz="914400" rtl="0" eaLnBrk="1" latinLnBrk="0" hangingPunct="1">
+    <a:lvl6pPr marL="2286000" algn="l" defTabSz="457200" rtl="0" eaLnBrk="1" latinLnBrk="0" hangingPunct="1">
       <a:defRPr sz="1800" kern="1200">
         <a:solidFill>
           <a:schemeClr val="tx1"/>
@@ -74,7 +73,7 @@
         <a:cs typeface="+mn-cs"/>
       </a:defRPr>
     </a:lvl6pPr>
-    <a:lvl7pPr marL="2743200" algn="l" defTabSz="914400" rtl="0" eaLnBrk="1" latinLnBrk="0" hangingPunct="1">
+    <a:lvl7pPr marL="2743200" algn="l" defTabSz="457200" rtl="0" eaLnBrk="1" latinLnBrk="0" hangingPunct="1">
       <a:defRPr sz="1800" kern="1200">
         <a:solidFill>
           <a:schemeClr val="tx1"/>
@@ -84,7 +83,7 @@
         <a:cs typeface="+mn-cs"/>
       </a:defRPr>
     </a:lvl7pPr>
-    <a:lvl8pPr marL="3200400" algn="l" defTabSz="914400" rtl="0" eaLnBrk="1" latinLnBrk="0" hangingPunct="1">
+    <a:lvl8pPr marL="3200400" algn="l" defTabSz="457200" rtl="0" eaLnBrk="1" latinLnBrk="0" hangingPunct="1">
       <a:defRPr sz="1800" kern="1200">
         <a:solidFill>
           <a:schemeClr val="tx1"/>
@@ -94,7 +93,7 @@
         <a:cs typeface="+mn-cs"/>
       </a:defRPr>
     </a:lvl8pPr>
-    <a:lvl9pPr marL="3657600" algn="l" defTabSz="914400" rtl="0" eaLnBrk="1" latinLnBrk="0" hangingPunct="1">
+    <a:lvl9pPr marL="3657600" algn="l" defTabSz="457200" rtl="0" eaLnBrk="1" latinLnBrk="0" hangingPunct="1">
       <a:defRPr sz="1800" kern="1200">
         <a:solidFill>
           <a:schemeClr val="tx1"/>
@@ -127,13 +126,7 @@
       </p:grpSpPr>
       <p:sp>
         <p:nvSpPr>
-          <p:cNvPr id="2" name="Title 1">
-            <a:extLst>
-              <a:ext uri="{FF2B5EF4-FFF2-40B4-BE49-F238E27FC236}">
-                <a16:creationId xmlns:a16="http://schemas.microsoft.com/office/drawing/2014/main" id="{5FB529AC-BAFC-4DB1-4869-3E63CA9803AD}"/>
-              </a:ext>
-            </a:extLst>
-          </p:cNvPr>
+          <p:cNvPr id="2" name="Title 1"/>
           <p:cNvSpPr>
             <a:spLocks noGrp="1"/>
           </p:cNvSpPr>
@@ -143,15 +136,15 @@
         </p:nvSpPr>
         <p:spPr>
           <a:xfrm>
-            <a:off x="1524000" y="1122363"/>
-            <a:ext cx="9144000" cy="2387600"/>
+            <a:off x="617141" y="493892"/>
+            <a:ext cx="3702844" cy="1050655"/>
           </a:xfrm>
         </p:spPr>
         <p:txBody>
           <a:bodyPr anchor="b"/>
           <a:lstStyle>
             <a:lvl1pPr algn="ctr">
-              <a:defRPr sz="6000"/>
+              <a:defRPr sz="2429"/>
             </a:lvl1pPr>
           </a:lstStyle>
           <a:p>
@@ -159,18 +152,13 @@
               <a:rPr lang="en-US"/>
               <a:t>Click to edit Master title style</a:t>
             </a:r>
-          </a:p>
-        </p:txBody>
-      </p:sp>
-      <p:sp>
-        <p:nvSpPr>
-          <p:cNvPr id="3" name="Subtitle 2">
-            <a:extLst>
-              <a:ext uri="{FF2B5EF4-FFF2-40B4-BE49-F238E27FC236}">
-                <a16:creationId xmlns:a16="http://schemas.microsoft.com/office/drawing/2014/main" id="{F27F2D0A-79D1-2BD5-0773-CC5E94B162B6}"/>
-              </a:ext>
-            </a:extLst>
-          </p:cNvPr>
+            <a:endParaRPr lang="en-US" dirty="0"/>
+          </a:p>
+        </p:txBody>
+      </p:sp>
+      <p:sp>
+        <p:nvSpPr>
+          <p:cNvPr id="3" name="Subtitle 2"/>
           <p:cNvSpPr>
             <a:spLocks noGrp="1"/>
           </p:cNvSpPr>
@@ -180,8 +168,8 @@
         </p:nvSpPr>
         <p:spPr>
           <a:xfrm>
-            <a:off x="1524000" y="3602038"/>
-            <a:ext cx="9144000" cy="1655762"/>
+            <a:off x="617141" y="1585064"/>
+            <a:ext cx="3702844" cy="728612"/>
           </a:xfrm>
         </p:spPr>
         <p:txBody>
@@ -189,39 +177,39 @@
           <a:lstStyle>
             <a:lvl1pPr marL="0" indent="0" algn="ctr">
               <a:buNone/>
-              <a:defRPr sz="2400"/>
+              <a:defRPr sz="972"/>
             </a:lvl1pPr>
-            <a:lvl2pPr marL="457200" indent="0" algn="ctr">
-              <a:buNone/>
-              <a:defRPr sz="2000"/>
+            <a:lvl2pPr marL="185120" indent="0" algn="ctr">
+              <a:buNone/>
+              <a:defRPr sz="810"/>
             </a:lvl2pPr>
-            <a:lvl3pPr marL="914400" indent="0" algn="ctr">
-              <a:buNone/>
-              <a:defRPr sz="1800"/>
+            <a:lvl3pPr marL="370241" indent="0" algn="ctr">
+              <a:buNone/>
+              <a:defRPr sz="729"/>
             </a:lvl3pPr>
-            <a:lvl4pPr marL="1371600" indent="0" algn="ctr">
-              <a:buNone/>
-              <a:defRPr sz="1600"/>
+            <a:lvl4pPr marL="555361" indent="0" algn="ctr">
+              <a:buNone/>
+              <a:defRPr sz="648"/>
             </a:lvl4pPr>
-            <a:lvl5pPr marL="1828800" indent="0" algn="ctr">
-              <a:buNone/>
-              <a:defRPr sz="1600"/>
+            <a:lvl5pPr marL="740481" indent="0" algn="ctr">
+              <a:buNone/>
+              <a:defRPr sz="648"/>
             </a:lvl5pPr>
-            <a:lvl6pPr marL="2286000" indent="0" algn="ctr">
-              <a:buNone/>
-              <a:defRPr sz="1600"/>
+            <a:lvl6pPr marL="925601" indent="0" algn="ctr">
+              <a:buNone/>
+              <a:defRPr sz="648"/>
             </a:lvl6pPr>
-            <a:lvl7pPr marL="2743200" indent="0" algn="ctr">
-              <a:buNone/>
-              <a:defRPr sz="1600"/>
+            <a:lvl7pPr marL="1110722" indent="0" algn="ctr">
+              <a:buNone/>
+              <a:defRPr sz="648"/>
             </a:lvl7pPr>
-            <a:lvl8pPr marL="3200400" indent="0" algn="ctr">
-              <a:buNone/>
-              <a:defRPr sz="1600"/>
+            <a:lvl8pPr marL="1295842" indent="0" algn="ctr">
+              <a:buNone/>
+              <a:defRPr sz="648"/>
             </a:lvl8pPr>
-            <a:lvl9pPr marL="3657600" indent="0" algn="ctr">
-              <a:buNone/>
-              <a:defRPr sz="1600"/>
+            <a:lvl9pPr marL="1480962" indent="0" algn="ctr">
+              <a:buNone/>
+              <a:defRPr sz="648"/>
             </a:lvl9pPr>
           </a:lstStyle>
           <a:p>
@@ -229,18 +217,13 @@
               <a:rPr lang="en-US"/>
               <a:t>Click to edit Master subtitle style</a:t>
             </a:r>
-          </a:p>
-        </p:txBody>
-      </p:sp>
-      <p:sp>
-        <p:nvSpPr>
-          <p:cNvPr id="4" name="Date Placeholder 3">
-            <a:extLst>
-              <a:ext uri="{FF2B5EF4-FFF2-40B4-BE49-F238E27FC236}">
-                <a16:creationId xmlns:a16="http://schemas.microsoft.com/office/drawing/2014/main" id="{BC164D99-9D3C-3BC9-C43E-896A45B77A2D}"/>
-              </a:ext>
-            </a:extLst>
-          </p:cNvPr>
+            <a:endParaRPr lang="en-US" dirty="0"/>
+          </a:p>
+        </p:txBody>
+      </p:sp>
+      <p:sp>
+        <p:nvSpPr>
+          <p:cNvPr id="4" name="Date Placeholder 3"/>
           <p:cNvSpPr>
             <a:spLocks noGrp="1"/>
           </p:cNvSpPr>
@@ -263,13 +246,7 @@
       </p:sp>
       <p:sp>
         <p:nvSpPr>
-          <p:cNvPr id="5" name="Footer Placeholder 4">
-            <a:extLst>
-              <a:ext uri="{FF2B5EF4-FFF2-40B4-BE49-F238E27FC236}">
-                <a16:creationId xmlns:a16="http://schemas.microsoft.com/office/drawing/2014/main" id="{CC6AE0D9-ECE5-78DB-58F5-140463BF097E}"/>
-              </a:ext>
-            </a:extLst>
-          </p:cNvPr>
+          <p:cNvPr id="5" name="Footer Placeholder 4"/>
           <p:cNvSpPr>
             <a:spLocks noGrp="1"/>
           </p:cNvSpPr>
@@ -288,13 +265,7 @@
       </p:sp>
       <p:sp>
         <p:nvSpPr>
-          <p:cNvPr id="6" name="Slide Number Placeholder 5">
-            <a:extLst>
-              <a:ext uri="{FF2B5EF4-FFF2-40B4-BE49-F238E27FC236}">
-                <a16:creationId xmlns:a16="http://schemas.microsoft.com/office/drawing/2014/main" id="{8024EA8D-0399-E0CA-CD4E-DA89011BBFE9}"/>
-              </a:ext>
-            </a:extLst>
-          </p:cNvPr>
+          <p:cNvPr id="6" name="Slide Number Placeholder 5"/>
           <p:cNvSpPr>
             <a:spLocks noGrp="1"/>
           </p:cNvSpPr>
@@ -318,7 +289,7 @@
     </p:spTree>
     <p:extLst>
       <p:ext uri="{BB962C8B-B14F-4D97-AF65-F5344CB8AC3E}">
-        <p14:creationId xmlns:p14="http://schemas.microsoft.com/office/powerpoint/2010/main" val="160505025"/>
+        <p14:creationId xmlns:p14="http://schemas.microsoft.com/office/powerpoint/2010/main" val="826470582"/>
       </p:ext>
     </p:extLst>
   </p:cSld>
@@ -347,13 +318,7 @@
       </p:grpSpPr>
       <p:sp>
         <p:nvSpPr>
-          <p:cNvPr id="2" name="Title 1">
-            <a:extLst>
-              <a:ext uri="{FF2B5EF4-FFF2-40B4-BE49-F238E27FC236}">
-                <a16:creationId xmlns:a16="http://schemas.microsoft.com/office/drawing/2014/main" id="{B941C3ED-053F-EE1D-B049-8F85FBFE7E59}"/>
-              </a:ext>
-            </a:extLst>
-          </p:cNvPr>
+          <p:cNvPr id="2" name="Title 1"/>
           <p:cNvSpPr>
             <a:spLocks noGrp="1"/>
           </p:cNvSpPr>
@@ -370,18 +335,13 @@
               <a:rPr lang="en-US"/>
               <a:t>Click to edit Master title style</a:t>
             </a:r>
-          </a:p>
-        </p:txBody>
-      </p:sp>
-      <p:sp>
-        <p:nvSpPr>
-          <p:cNvPr id="3" name="Vertical Text Placeholder 2">
-            <a:extLst>
-              <a:ext uri="{FF2B5EF4-FFF2-40B4-BE49-F238E27FC236}">
-                <a16:creationId xmlns:a16="http://schemas.microsoft.com/office/drawing/2014/main" id="{3ACA91E7-9732-14B0-D706-4802D390BCB1}"/>
-              </a:ext>
-            </a:extLst>
-          </p:cNvPr>
+            <a:endParaRPr lang="en-US" dirty="0"/>
+          </a:p>
+        </p:txBody>
+      </p:sp>
+      <p:sp>
+        <p:nvSpPr>
+          <p:cNvPr id="3" name="Vertical Text Placeholder 2"/>
           <p:cNvSpPr>
             <a:spLocks noGrp="1"/>
           </p:cNvSpPr>
@@ -427,18 +387,13 @@
               <a:rPr lang="en-US"/>
               <a:t>Fifth level</a:t>
             </a:r>
-          </a:p>
-        </p:txBody>
-      </p:sp>
-      <p:sp>
-        <p:nvSpPr>
-          <p:cNvPr id="4" name="Date Placeholder 3">
-            <a:extLst>
-              <a:ext uri="{FF2B5EF4-FFF2-40B4-BE49-F238E27FC236}">
-                <a16:creationId xmlns:a16="http://schemas.microsoft.com/office/drawing/2014/main" id="{258D3D4D-BD4F-40FE-8E64-BF53CD0F3630}"/>
-              </a:ext>
-            </a:extLst>
-          </p:cNvPr>
+            <a:endParaRPr lang="en-US" dirty="0"/>
+          </a:p>
+        </p:txBody>
+      </p:sp>
+      <p:sp>
+        <p:nvSpPr>
+          <p:cNvPr id="4" name="Date Placeholder 3"/>
           <p:cNvSpPr>
             <a:spLocks noGrp="1"/>
           </p:cNvSpPr>
@@ -461,13 +416,7 @@
       </p:sp>
       <p:sp>
         <p:nvSpPr>
-          <p:cNvPr id="5" name="Footer Placeholder 4">
-            <a:extLst>
-              <a:ext uri="{FF2B5EF4-FFF2-40B4-BE49-F238E27FC236}">
-                <a16:creationId xmlns:a16="http://schemas.microsoft.com/office/drawing/2014/main" id="{8A0FBA14-D7B6-482F-7399-37A2B0F85608}"/>
-              </a:ext>
-            </a:extLst>
-          </p:cNvPr>
+          <p:cNvPr id="5" name="Footer Placeholder 4"/>
           <p:cNvSpPr>
             <a:spLocks noGrp="1"/>
           </p:cNvSpPr>
@@ -486,13 +435,7 @@
       </p:sp>
       <p:sp>
         <p:nvSpPr>
-          <p:cNvPr id="6" name="Slide Number Placeholder 5">
-            <a:extLst>
-              <a:ext uri="{FF2B5EF4-FFF2-40B4-BE49-F238E27FC236}">
-                <a16:creationId xmlns:a16="http://schemas.microsoft.com/office/drawing/2014/main" id="{5CFE2098-88D0-8EF1-544B-1F062EC00AD4}"/>
-              </a:ext>
-            </a:extLst>
-          </p:cNvPr>
+          <p:cNvPr id="6" name="Slide Number Placeholder 5"/>
           <p:cNvSpPr>
             <a:spLocks noGrp="1"/>
           </p:cNvSpPr>
@@ -516,7 +459,7 @@
     </p:spTree>
     <p:extLst>
       <p:ext uri="{BB962C8B-B14F-4D97-AF65-F5344CB8AC3E}">
-        <p14:creationId xmlns:p14="http://schemas.microsoft.com/office/powerpoint/2010/main" val="2489864900"/>
+        <p14:creationId xmlns:p14="http://schemas.microsoft.com/office/powerpoint/2010/main" val="108943221"/>
       </p:ext>
     </p:extLst>
   </p:cSld>
@@ -545,13 +488,7 @@
       </p:grpSpPr>
       <p:sp>
         <p:nvSpPr>
-          <p:cNvPr id="2" name="Vertical Title 1">
-            <a:extLst>
-              <a:ext uri="{FF2B5EF4-FFF2-40B4-BE49-F238E27FC236}">
-                <a16:creationId xmlns:a16="http://schemas.microsoft.com/office/drawing/2014/main" id="{B0607AAF-7FF4-109F-3A20-7D6A53D66B0E}"/>
-              </a:ext>
-            </a:extLst>
-          </p:cNvPr>
+          <p:cNvPr id="2" name="Vertical Title 1"/>
           <p:cNvSpPr>
             <a:spLocks noGrp="1"/>
           </p:cNvSpPr>
@@ -561,8 +498,8 @@
         </p:nvSpPr>
         <p:spPr>
           <a:xfrm>
-            <a:off x="8724900" y="365125"/>
-            <a:ext cx="2628900" cy="5811838"/>
+            <a:off x="3533130" y="160672"/>
+            <a:ext cx="1064568" cy="2557478"/>
           </a:xfrm>
         </p:spPr>
         <p:txBody>
@@ -573,18 +510,13 @@
               <a:rPr lang="en-US"/>
               <a:t>Click to edit Master title style</a:t>
             </a:r>
-          </a:p>
-        </p:txBody>
-      </p:sp>
-      <p:sp>
-        <p:nvSpPr>
-          <p:cNvPr id="3" name="Vertical Text Placeholder 2">
-            <a:extLst>
-              <a:ext uri="{FF2B5EF4-FFF2-40B4-BE49-F238E27FC236}">
-                <a16:creationId xmlns:a16="http://schemas.microsoft.com/office/drawing/2014/main" id="{F667AC0B-7088-D7F7-FFBB-AF1819752AE1}"/>
-              </a:ext>
-            </a:extLst>
-          </p:cNvPr>
+            <a:endParaRPr lang="en-US" dirty="0"/>
+          </a:p>
+        </p:txBody>
+      </p:sp>
+      <p:sp>
+        <p:nvSpPr>
+          <p:cNvPr id="3" name="Vertical Text Placeholder 2"/>
           <p:cNvSpPr>
             <a:spLocks noGrp="1"/>
           </p:cNvSpPr>
@@ -594,8 +526,8 @@
         </p:nvSpPr>
         <p:spPr>
           <a:xfrm>
-            <a:off x="838200" y="365125"/>
-            <a:ext cx="7734300" cy="5811838"/>
+            <a:off x="339427" y="160672"/>
+            <a:ext cx="3131989" cy="2557478"/>
           </a:xfrm>
         </p:spPr>
         <p:txBody>
@@ -635,18 +567,13 @@
               <a:rPr lang="en-US"/>
               <a:t>Fifth level</a:t>
             </a:r>
-          </a:p>
-        </p:txBody>
-      </p:sp>
-      <p:sp>
-        <p:nvSpPr>
-          <p:cNvPr id="4" name="Date Placeholder 3">
-            <a:extLst>
-              <a:ext uri="{FF2B5EF4-FFF2-40B4-BE49-F238E27FC236}">
-                <a16:creationId xmlns:a16="http://schemas.microsoft.com/office/drawing/2014/main" id="{E974CE99-ED29-EF5D-CA62-D5819817CDA2}"/>
-              </a:ext>
-            </a:extLst>
-          </p:cNvPr>
+            <a:endParaRPr lang="en-US" dirty="0"/>
+          </a:p>
+        </p:txBody>
+      </p:sp>
+      <p:sp>
+        <p:nvSpPr>
+          <p:cNvPr id="4" name="Date Placeholder 3"/>
           <p:cNvSpPr>
             <a:spLocks noGrp="1"/>
           </p:cNvSpPr>
@@ -669,13 +596,7 @@
       </p:sp>
       <p:sp>
         <p:nvSpPr>
-          <p:cNvPr id="5" name="Footer Placeholder 4">
-            <a:extLst>
-              <a:ext uri="{FF2B5EF4-FFF2-40B4-BE49-F238E27FC236}">
-                <a16:creationId xmlns:a16="http://schemas.microsoft.com/office/drawing/2014/main" id="{2479ACE6-4E8C-2095-7734-C6EE5CDFC733}"/>
-              </a:ext>
-            </a:extLst>
-          </p:cNvPr>
+          <p:cNvPr id="5" name="Footer Placeholder 4"/>
           <p:cNvSpPr>
             <a:spLocks noGrp="1"/>
           </p:cNvSpPr>
@@ -694,13 +615,7 @@
       </p:sp>
       <p:sp>
         <p:nvSpPr>
-          <p:cNvPr id="6" name="Slide Number Placeholder 5">
-            <a:extLst>
-              <a:ext uri="{FF2B5EF4-FFF2-40B4-BE49-F238E27FC236}">
-                <a16:creationId xmlns:a16="http://schemas.microsoft.com/office/drawing/2014/main" id="{D374C125-3DEA-1046-F801-1DFFF11B1F0A}"/>
-              </a:ext>
-            </a:extLst>
-          </p:cNvPr>
+          <p:cNvPr id="6" name="Slide Number Placeholder 5"/>
           <p:cNvSpPr>
             <a:spLocks noGrp="1"/>
           </p:cNvSpPr>
@@ -724,7 +639,7 @@
     </p:spTree>
     <p:extLst>
       <p:ext uri="{BB962C8B-B14F-4D97-AF65-F5344CB8AC3E}">
-        <p14:creationId xmlns:p14="http://schemas.microsoft.com/office/powerpoint/2010/main" val="3544826686"/>
+        <p14:creationId xmlns:p14="http://schemas.microsoft.com/office/powerpoint/2010/main" val="2314553822"/>
       </p:ext>
     </p:extLst>
   </p:cSld>
@@ -753,13 +668,7 @@
       </p:grpSpPr>
       <p:sp>
         <p:nvSpPr>
-          <p:cNvPr id="2" name="Title 1">
-            <a:extLst>
-              <a:ext uri="{FF2B5EF4-FFF2-40B4-BE49-F238E27FC236}">
-                <a16:creationId xmlns:a16="http://schemas.microsoft.com/office/drawing/2014/main" id="{2F052F5F-DD6A-C0F8-5C52-0079F82CAD8E}"/>
-              </a:ext>
-            </a:extLst>
-          </p:cNvPr>
+          <p:cNvPr id="2" name="Title 1"/>
           <p:cNvSpPr>
             <a:spLocks noGrp="1"/>
           </p:cNvSpPr>
@@ -776,18 +685,13 @@
               <a:rPr lang="en-US"/>
               <a:t>Click to edit Master title style</a:t>
             </a:r>
-          </a:p>
-        </p:txBody>
-      </p:sp>
-      <p:sp>
-        <p:nvSpPr>
-          <p:cNvPr id="3" name="Content Placeholder 2">
-            <a:extLst>
-              <a:ext uri="{FF2B5EF4-FFF2-40B4-BE49-F238E27FC236}">
-                <a16:creationId xmlns:a16="http://schemas.microsoft.com/office/drawing/2014/main" id="{A7DDA25A-F140-7337-CF9F-D3D9F270A9DA}"/>
-              </a:ext>
-            </a:extLst>
-          </p:cNvPr>
+            <a:endParaRPr lang="en-US" dirty="0"/>
+          </a:p>
+        </p:txBody>
+      </p:sp>
+      <p:sp>
+        <p:nvSpPr>
+          <p:cNvPr id="3" name="Content Placeholder 2"/>
           <p:cNvSpPr>
             <a:spLocks noGrp="1"/>
           </p:cNvSpPr>
@@ -833,18 +737,13 @@
               <a:rPr lang="en-US"/>
               <a:t>Fifth level</a:t>
             </a:r>
-          </a:p>
-        </p:txBody>
-      </p:sp>
-      <p:sp>
-        <p:nvSpPr>
-          <p:cNvPr id="4" name="Date Placeholder 3">
-            <a:extLst>
-              <a:ext uri="{FF2B5EF4-FFF2-40B4-BE49-F238E27FC236}">
-                <a16:creationId xmlns:a16="http://schemas.microsoft.com/office/drawing/2014/main" id="{6B09498E-C99D-CA34-8508-8019AA832762}"/>
-              </a:ext>
-            </a:extLst>
-          </p:cNvPr>
+            <a:endParaRPr lang="en-US" dirty="0"/>
+          </a:p>
+        </p:txBody>
+      </p:sp>
+      <p:sp>
+        <p:nvSpPr>
+          <p:cNvPr id="4" name="Date Placeholder 3"/>
           <p:cNvSpPr>
             <a:spLocks noGrp="1"/>
           </p:cNvSpPr>
@@ -867,13 +766,7 @@
       </p:sp>
       <p:sp>
         <p:nvSpPr>
-          <p:cNvPr id="5" name="Footer Placeholder 4">
-            <a:extLst>
-              <a:ext uri="{FF2B5EF4-FFF2-40B4-BE49-F238E27FC236}">
-                <a16:creationId xmlns:a16="http://schemas.microsoft.com/office/drawing/2014/main" id="{ED994AC5-3674-D0CD-CD09-9340EEAE1008}"/>
-              </a:ext>
-            </a:extLst>
-          </p:cNvPr>
+          <p:cNvPr id="5" name="Footer Placeholder 4"/>
           <p:cNvSpPr>
             <a:spLocks noGrp="1"/>
           </p:cNvSpPr>
@@ -892,13 +785,7 @@
       </p:sp>
       <p:sp>
         <p:nvSpPr>
-          <p:cNvPr id="6" name="Slide Number Placeholder 5">
-            <a:extLst>
-              <a:ext uri="{FF2B5EF4-FFF2-40B4-BE49-F238E27FC236}">
-                <a16:creationId xmlns:a16="http://schemas.microsoft.com/office/drawing/2014/main" id="{5DC00E2B-ADB3-DD91-BA23-D7CAAB35556F}"/>
-              </a:ext>
-            </a:extLst>
-          </p:cNvPr>
+          <p:cNvPr id="6" name="Slide Number Placeholder 5"/>
           <p:cNvSpPr>
             <a:spLocks noGrp="1"/>
           </p:cNvSpPr>
@@ -922,7 +809,7 @@
     </p:spTree>
     <p:extLst>
       <p:ext uri="{BB962C8B-B14F-4D97-AF65-F5344CB8AC3E}">
-        <p14:creationId xmlns:p14="http://schemas.microsoft.com/office/powerpoint/2010/main" val="1071037056"/>
+        <p14:creationId xmlns:p14="http://schemas.microsoft.com/office/powerpoint/2010/main" val="3325947125"/>
       </p:ext>
     </p:extLst>
   </p:cSld>
@@ -951,13 +838,7 @@
       </p:grpSpPr>
       <p:sp>
         <p:nvSpPr>
-          <p:cNvPr id="2" name="Title 1">
-            <a:extLst>
-              <a:ext uri="{FF2B5EF4-FFF2-40B4-BE49-F238E27FC236}">
-                <a16:creationId xmlns:a16="http://schemas.microsoft.com/office/drawing/2014/main" id="{5CCB496D-62D1-8DDD-3DC9-575A8520D0D9}"/>
-              </a:ext>
-            </a:extLst>
-          </p:cNvPr>
+          <p:cNvPr id="2" name="Title 1"/>
           <p:cNvSpPr>
             <a:spLocks noGrp="1"/>
           </p:cNvSpPr>
@@ -967,15 +848,15 @@
         </p:nvSpPr>
         <p:spPr>
           <a:xfrm>
-            <a:off x="831850" y="1709738"/>
-            <a:ext cx="10515600" cy="2852737"/>
+            <a:off x="336856" y="752364"/>
+            <a:ext cx="4258270" cy="1255337"/>
           </a:xfrm>
         </p:spPr>
         <p:txBody>
           <a:bodyPr anchor="b"/>
           <a:lstStyle>
             <a:lvl1pPr>
-              <a:defRPr sz="6000"/>
+              <a:defRPr sz="2429"/>
             </a:lvl1pPr>
           </a:lstStyle>
           <a:p>
@@ -983,18 +864,13 @@
               <a:rPr lang="en-US"/>
               <a:t>Click to edit Master title style</a:t>
             </a:r>
-          </a:p>
-        </p:txBody>
-      </p:sp>
-      <p:sp>
-        <p:nvSpPr>
-          <p:cNvPr id="3" name="Text Placeholder 2">
-            <a:extLst>
-              <a:ext uri="{FF2B5EF4-FFF2-40B4-BE49-F238E27FC236}">
-                <a16:creationId xmlns:a16="http://schemas.microsoft.com/office/drawing/2014/main" id="{2F0C1FD7-E311-9125-72C1-9A5F716315FE}"/>
-              </a:ext>
-            </a:extLst>
-          </p:cNvPr>
+            <a:endParaRPr lang="en-US" dirty="0"/>
+          </a:p>
+        </p:txBody>
+      </p:sp>
+      <p:sp>
+        <p:nvSpPr>
+          <p:cNvPr id="3" name="Text Placeholder 2"/>
           <p:cNvSpPr>
             <a:spLocks noGrp="1"/>
           </p:cNvSpPr>
@@ -1004,8 +880,8 @@
         </p:nvSpPr>
         <p:spPr>
           <a:xfrm>
-            <a:off x="831850" y="4589463"/>
-            <a:ext cx="10515600" cy="1500187"/>
+            <a:off x="336856" y="2019577"/>
+            <a:ext cx="4258270" cy="660152"/>
           </a:xfrm>
         </p:spPr>
         <p:txBody>
@@ -1013,7 +889,7 @@
           <a:lstStyle>
             <a:lvl1pPr marL="0" indent="0">
               <a:buNone/>
-              <a:defRPr sz="2400">
+              <a:defRPr sz="972">
                 <a:solidFill>
                   <a:schemeClr val="tx1">
                     <a:tint val="82000"/>
@@ -1021,9 +897,9 @@
                 </a:solidFill>
               </a:defRPr>
             </a:lvl1pPr>
-            <a:lvl2pPr marL="457200" indent="0">
-              <a:buNone/>
-              <a:defRPr sz="2000">
+            <a:lvl2pPr marL="185120" indent="0">
+              <a:buNone/>
+              <a:defRPr sz="810">
                 <a:solidFill>
                   <a:schemeClr val="tx1">
                     <a:tint val="82000"/>
@@ -1031,9 +907,9 @@
                 </a:solidFill>
               </a:defRPr>
             </a:lvl2pPr>
-            <a:lvl3pPr marL="914400" indent="0">
-              <a:buNone/>
-              <a:defRPr sz="1800">
+            <a:lvl3pPr marL="370241" indent="0">
+              <a:buNone/>
+              <a:defRPr sz="729">
                 <a:solidFill>
                   <a:schemeClr val="tx1">
                     <a:tint val="82000"/>
@@ -1041,9 +917,9 @@
                 </a:solidFill>
               </a:defRPr>
             </a:lvl3pPr>
-            <a:lvl4pPr marL="1371600" indent="0">
-              <a:buNone/>
-              <a:defRPr sz="1600">
+            <a:lvl4pPr marL="555361" indent="0">
+              <a:buNone/>
+              <a:defRPr sz="648">
                 <a:solidFill>
                   <a:schemeClr val="tx1">
                     <a:tint val="82000"/>
@@ -1051,9 +927,9 @@
                 </a:solidFill>
               </a:defRPr>
             </a:lvl4pPr>
-            <a:lvl5pPr marL="1828800" indent="0">
-              <a:buNone/>
-              <a:defRPr sz="1600">
+            <a:lvl5pPr marL="740481" indent="0">
+              <a:buNone/>
+              <a:defRPr sz="648">
                 <a:solidFill>
                   <a:schemeClr val="tx1">
                     <a:tint val="82000"/>
@@ -1061,9 +937,9 @@
                 </a:solidFill>
               </a:defRPr>
             </a:lvl5pPr>
-            <a:lvl6pPr marL="2286000" indent="0">
-              <a:buNone/>
-              <a:defRPr sz="1600">
+            <a:lvl6pPr marL="925601" indent="0">
+              <a:buNone/>
+              <a:defRPr sz="648">
                 <a:solidFill>
                   <a:schemeClr val="tx1">
                     <a:tint val="82000"/>
@@ -1071,9 +947,9 @@
                 </a:solidFill>
               </a:defRPr>
             </a:lvl6pPr>
-            <a:lvl7pPr marL="2743200" indent="0">
-              <a:buNone/>
-              <a:defRPr sz="1600">
+            <a:lvl7pPr marL="1110722" indent="0">
+              <a:buNone/>
+              <a:defRPr sz="648">
                 <a:solidFill>
                   <a:schemeClr val="tx1">
                     <a:tint val="82000"/>
@@ -1081,9 +957,9 @@
                 </a:solidFill>
               </a:defRPr>
             </a:lvl7pPr>
-            <a:lvl8pPr marL="3200400" indent="0">
-              <a:buNone/>
-              <a:defRPr sz="1600">
+            <a:lvl8pPr marL="1295842" indent="0">
+              <a:buNone/>
+              <a:defRPr sz="648">
                 <a:solidFill>
                   <a:schemeClr val="tx1">
                     <a:tint val="82000"/>
@@ -1091,9 +967,9 @@
                 </a:solidFill>
               </a:defRPr>
             </a:lvl8pPr>
-            <a:lvl9pPr marL="3657600" indent="0">
-              <a:buNone/>
-              <a:defRPr sz="1600">
+            <a:lvl9pPr marL="1480962" indent="0">
+              <a:buNone/>
+              <a:defRPr sz="648">
                 <a:solidFill>
                   <a:schemeClr val="tx1">
                     <a:tint val="82000"/>
@@ -1113,13 +989,7 @@
       </p:sp>
       <p:sp>
         <p:nvSpPr>
-          <p:cNvPr id="4" name="Date Placeholder 3">
-            <a:extLst>
-              <a:ext uri="{FF2B5EF4-FFF2-40B4-BE49-F238E27FC236}">
-                <a16:creationId xmlns:a16="http://schemas.microsoft.com/office/drawing/2014/main" id="{130A9EAC-D8D8-05B8-5ED2-6BD2AAA847C4}"/>
-              </a:ext>
-            </a:extLst>
-          </p:cNvPr>
+          <p:cNvPr id="4" name="Date Placeholder 3"/>
           <p:cNvSpPr>
             <a:spLocks noGrp="1"/>
           </p:cNvSpPr>
@@ -1142,13 +1012,7 @@
       </p:sp>
       <p:sp>
         <p:nvSpPr>
-          <p:cNvPr id="5" name="Footer Placeholder 4">
-            <a:extLst>
-              <a:ext uri="{FF2B5EF4-FFF2-40B4-BE49-F238E27FC236}">
-                <a16:creationId xmlns:a16="http://schemas.microsoft.com/office/drawing/2014/main" id="{8AF592EA-8296-A3D1-CADA-78917FC169B6}"/>
-              </a:ext>
-            </a:extLst>
-          </p:cNvPr>
+          <p:cNvPr id="5" name="Footer Placeholder 4"/>
           <p:cNvSpPr>
             <a:spLocks noGrp="1"/>
           </p:cNvSpPr>
@@ -1167,13 +1031,7 @@
       </p:sp>
       <p:sp>
         <p:nvSpPr>
-          <p:cNvPr id="6" name="Slide Number Placeholder 5">
-            <a:extLst>
-              <a:ext uri="{FF2B5EF4-FFF2-40B4-BE49-F238E27FC236}">
-                <a16:creationId xmlns:a16="http://schemas.microsoft.com/office/drawing/2014/main" id="{405834DC-C6C5-9B9F-5EE3-D9FE4D577E4F}"/>
-              </a:ext>
-            </a:extLst>
-          </p:cNvPr>
+          <p:cNvPr id="6" name="Slide Number Placeholder 5"/>
           <p:cNvSpPr>
             <a:spLocks noGrp="1"/>
           </p:cNvSpPr>
@@ -1197,7 +1055,7 @@
     </p:spTree>
     <p:extLst>
       <p:ext uri="{BB962C8B-B14F-4D97-AF65-F5344CB8AC3E}">
-        <p14:creationId xmlns:p14="http://schemas.microsoft.com/office/powerpoint/2010/main" val="104177794"/>
+        <p14:creationId xmlns:p14="http://schemas.microsoft.com/office/powerpoint/2010/main" val="2736370598"/>
       </p:ext>
     </p:extLst>
   </p:cSld>
@@ -1226,13 +1084,7 @@
       </p:grpSpPr>
       <p:sp>
         <p:nvSpPr>
-          <p:cNvPr id="2" name="Title 1">
-            <a:extLst>
-              <a:ext uri="{FF2B5EF4-FFF2-40B4-BE49-F238E27FC236}">
-                <a16:creationId xmlns:a16="http://schemas.microsoft.com/office/drawing/2014/main" id="{E43ACA02-8C87-84D8-CBA4-26685837A534}"/>
-              </a:ext>
-            </a:extLst>
-          </p:cNvPr>
+          <p:cNvPr id="2" name="Title 1"/>
           <p:cNvSpPr>
             <a:spLocks noGrp="1"/>
           </p:cNvSpPr>
@@ -1249,18 +1101,13 @@
               <a:rPr lang="en-US"/>
               <a:t>Click to edit Master title style</a:t>
             </a:r>
-          </a:p>
-        </p:txBody>
-      </p:sp>
-      <p:sp>
-        <p:nvSpPr>
-          <p:cNvPr id="3" name="Content Placeholder 2">
-            <a:extLst>
-              <a:ext uri="{FF2B5EF4-FFF2-40B4-BE49-F238E27FC236}">
-                <a16:creationId xmlns:a16="http://schemas.microsoft.com/office/drawing/2014/main" id="{FFEB9582-80BB-1983-A2B5-3C456657802E}"/>
-              </a:ext>
-            </a:extLst>
-          </p:cNvPr>
+            <a:endParaRPr lang="en-US" dirty="0"/>
+          </a:p>
+        </p:txBody>
+      </p:sp>
+      <p:sp>
+        <p:nvSpPr>
+          <p:cNvPr id="3" name="Content Placeholder 2"/>
           <p:cNvSpPr>
             <a:spLocks noGrp="1"/>
           </p:cNvSpPr>
@@ -1270,8 +1117,8 @@
         </p:nvSpPr>
         <p:spPr>
           <a:xfrm>
-            <a:off x="838200" y="1825625"/>
-            <a:ext cx="5181600" cy="4351338"/>
+            <a:off x="339427" y="803360"/>
+            <a:ext cx="2098278" cy="1914790"/>
           </a:xfrm>
         </p:spPr>
         <p:txBody>
@@ -1311,18 +1158,13 @@
               <a:rPr lang="en-US"/>
               <a:t>Fifth level</a:t>
             </a:r>
-          </a:p>
-        </p:txBody>
-      </p:sp>
-      <p:sp>
-        <p:nvSpPr>
-          <p:cNvPr id="4" name="Content Placeholder 3">
-            <a:extLst>
-              <a:ext uri="{FF2B5EF4-FFF2-40B4-BE49-F238E27FC236}">
-                <a16:creationId xmlns:a16="http://schemas.microsoft.com/office/drawing/2014/main" id="{6BB4A69E-47EA-9FB8-34D6-DDB8D1D37992}"/>
-              </a:ext>
-            </a:extLst>
-          </p:cNvPr>
+            <a:endParaRPr lang="en-US" dirty="0"/>
+          </a:p>
+        </p:txBody>
+      </p:sp>
+      <p:sp>
+        <p:nvSpPr>
+          <p:cNvPr id="4" name="Content Placeholder 3"/>
           <p:cNvSpPr>
             <a:spLocks noGrp="1"/>
           </p:cNvSpPr>
@@ -1332,8 +1174,8 @@
         </p:nvSpPr>
         <p:spPr>
           <a:xfrm>
-            <a:off x="6172200" y="1825625"/>
-            <a:ext cx="5181600" cy="4351338"/>
+            <a:off x="2499420" y="803360"/>
+            <a:ext cx="2098278" cy="1914790"/>
           </a:xfrm>
         </p:spPr>
         <p:txBody>
@@ -1373,18 +1215,13 @@
               <a:rPr lang="en-US"/>
               <a:t>Fifth level</a:t>
             </a:r>
-          </a:p>
-        </p:txBody>
-      </p:sp>
-      <p:sp>
-        <p:nvSpPr>
-          <p:cNvPr id="5" name="Date Placeholder 4">
-            <a:extLst>
-              <a:ext uri="{FF2B5EF4-FFF2-40B4-BE49-F238E27FC236}">
-                <a16:creationId xmlns:a16="http://schemas.microsoft.com/office/drawing/2014/main" id="{F9F07A8F-01CC-AEBD-014C-2F1BF45ED721}"/>
-              </a:ext>
-            </a:extLst>
-          </p:cNvPr>
+            <a:endParaRPr lang="en-US" dirty="0"/>
+          </a:p>
+        </p:txBody>
+      </p:sp>
+      <p:sp>
+        <p:nvSpPr>
+          <p:cNvPr id="5" name="Date Placeholder 4"/>
           <p:cNvSpPr>
             <a:spLocks noGrp="1"/>
           </p:cNvSpPr>
@@ -1407,13 +1244,7 @@
       </p:sp>
       <p:sp>
         <p:nvSpPr>
-          <p:cNvPr id="6" name="Footer Placeholder 5">
-            <a:extLst>
-              <a:ext uri="{FF2B5EF4-FFF2-40B4-BE49-F238E27FC236}">
-                <a16:creationId xmlns:a16="http://schemas.microsoft.com/office/drawing/2014/main" id="{D9E5A618-4C51-6915-1640-EFC6F2C7196C}"/>
-              </a:ext>
-            </a:extLst>
-          </p:cNvPr>
+          <p:cNvPr id="6" name="Footer Placeholder 5"/>
           <p:cNvSpPr>
             <a:spLocks noGrp="1"/>
           </p:cNvSpPr>
@@ -1432,13 +1263,7 @@
       </p:sp>
       <p:sp>
         <p:nvSpPr>
-          <p:cNvPr id="7" name="Slide Number Placeholder 6">
-            <a:extLst>
-              <a:ext uri="{FF2B5EF4-FFF2-40B4-BE49-F238E27FC236}">
-                <a16:creationId xmlns:a16="http://schemas.microsoft.com/office/drawing/2014/main" id="{1F6A73CF-DA98-FD49-2F4E-D283E859902C}"/>
-              </a:ext>
-            </a:extLst>
-          </p:cNvPr>
+          <p:cNvPr id="7" name="Slide Number Placeholder 6"/>
           <p:cNvSpPr>
             <a:spLocks noGrp="1"/>
           </p:cNvSpPr>
@@ -1462,7 +1287,7 @@
     </p:spTree>
     <p:extLst>
       <p:ext uri="{BB962C8B-B14F-4D97-AF65-F5344CB8AC3E}">
-        <p14:creationId xmlns:p14="http://schemas.microsoft.com/office/powerpoint/2010/main" val="936051405"/>
+        <p14:creationId xmlns:p14="http://schemas.microsoft.com/office/powerpoint/2010/main" val="2541888291"/>
       </p:ext>
     </p:extLst>
   </p:cSld>
@@ -1491,13 +1316,7 @@
       </p:grpSpPr>
       <p:sp>
         <p:nvSpPr>
-          <p:cNvPr id="2" name="Title 1">
-            <a:extLst>
-              <a:ext uri="{FF2B5EF4-FFF2-40B4-BE49-F238E27FC236}">
-                <a16:creationId xmlns:a16="http://schemas.microsoft.com/office/drawing/2014/main" id="{B76FA136-5225-0C1E-8CCA-523FDC598700}"/>
-              </a:ext>
-            </a:extLst>
-          </p:cNvPr>
+          <p:cNvPr id="2" name="Title 1"/>
           <p:cNvSpPr>
             <a:spLocks noGrp="1"/>
           </p:cNvSpPr>
@@ -1507,8 +1326,8 @@
         </p:nvSpPr>
         <p:spPr>
           <a:xfrm>
-            <a:off x="839788" y="365125"/>
-            <a:ext cx="10515600" cy="1325563"/>
+            <a:off x="340071" y="160672"/>
+            <a:ext cx="4258270" cy="583309"/>
           </a:xfrm>
         </p:spPr>
         <p:txBody>
@@ -1519,18 +1338,13 @@
               <a:rPr lang="en-US"/>
               <a:t>Click to edit Master title style</a:t>
             </a:r>
-          </a:p>
-        </p:txBody>
-      </p:sp>
-      <p:sp>
-        <p:nvSpPr>
-          <p:cNvPr id="3" name="Text Placeholder 2">
-            <a:extLst>
-              <a:ext uri="{FF2B5EF4-FFF2-40B4-BE49-F238E27FC236}">
-                <a16:creationId xmlns:a16="http://schemas.microsoft.com/office/drawing/2014/main" id="{BAC8CBB7-FB06-11EC-1D8E-C30A9B1D7D66}"/>
-              </a:ext>
-            </a:extLst>
-          </p:cNvPr>
+            <a:endParaRPr lang="en-US" dirty="0"/>
+          </a:p>
+        </p:txBody>
+      </p:sp>
+      <p:sp>
+        <p:nvSpPr>
+          <p:cNvPr id="3" name="Text Placeholder 2"/>
           <p:cNvSpPr>
             <a:spLocks noGrp="1"/>
           </p:cNvSpPr>
@@ -1540,8 +1354,8 @@
         </p:nvSpPr>
         <p:spPr>
           <a:xfrm>
-            <a:off x="839788" y="1681163"/>
-            <a:ext cx="5157787" cy="823912"/>
+            <a:off x="340071" y="739790"/>
+            <a:ext cx="2088635" cy="362559"/>
           </a:xfrm>
         </p:spPr>
         <p:txBody>
@@ -1549,39 +1363,39 @@
           <a:lstStyle>
             <a:lvl1pPr marL="0" indent="0">
               <a:buNone/>
-              <a:defRPr sz="2400" b="1"/>
+              <a:defRPr sz="972" b="1"/>
             </a:lvl1pPr>
-            <a:lvl2pPr marL="457200" indent="0">
-              <a:buNone/>
-              <a:defRPr sz="2000" b="1"/>
+            <a:lvl2pPr marL="185120" indent="0">
+              <a:buNone/>
+              <a:defRPr sz="810" b="1"/>
             </a:lvl2pPr>
-            <a:lvl3pPr marL="914400" indent="0">
-              <a:buNone/>
-              <a:defRPr sz="1800" b="1"/>
+            <a:lvl3pPr marL="370241" indent="0">
+              <a:buNone/>
+              <a:defRPr sz="729" b="1"/>
             </a:lvl3pPr>
-            <a:lvl4pPr marL="1371600" indent="0">
-              <a:buNone/>
-              <a:defRPr sz="1600" b="1"/>
+            <a:lvl4pPr marL="555361" indent="0">
+              <a:buNone/>
+              <a:defRPr sz="648" b="1"/>
             </a:lvl4pPr>
-            <a:lvl5pPr marL="1828800" indent="0">
-              <a:buNone/>
-              <a:defRPr sz="1600" b="1"/>
+            <a:lvl5pPr marL="740481" indent="0">
+              <a:buNone/>
+              <a:defRPr sz="648" b="1"/>
             </a:lvl5pPr>
-            <a:lvl6pPr marL="2286000" indent="0">
-              <a:buNone/>
-              <a:defRPr sz="1600" b="1"/>
+            <a:lvl6pPr marL="925601" indent="0">
+              <a:buNone/>
+              <a:defRPr sz="648" b="1"/>
             </a:lvl6pPr>
-            <a:lvl7pPr marL="2743200" indent="0">
-              <a:buNone/>
-              <a:defRPr sz="1600" b="1"/>
+            <a:lvl7pPr marL="1110722" indent="0">
+              <a:buNone/>
+              <a:defRPr sz="648" b="1"/>
             </a:lvl7pPr>
-            <a:lvl8pPr marL="3200400" indent="0">
-              <a:buNone/>
-              <a:defRPr sz="1600" b="1"/>
+            <a:lvl8pPr marL="1295842" indent="0">
+              <a:buNone/>
+              <a:defRPr sz="648" b="1"/>
             </a:lvl8pPr>
-            <a:lvl9pPr marL="3657600" indent="0">
-              <a:buNone/>
-              <a:defRPr sz="1600" b="1"/>
+            <a:lvl9pPr marL="1480962" indent="0">
+              <a:buNone/>
+              <a:defRPr sz="648" b="1"/>
             </a:lvl9pPr>
           </a:lstStyle>
           <a:p>
@@ -1595,13 +1409,7 @@
       </p:sp>
       <p:sp>
         <p:nvSpPr>
-          <p:cNvPr id="4" name="Content Placeholder 3">
-            <a:extLst>
-              <a:ext uri="{FF2B5EF4-FFF2-40B4-BE49-F238E27FC236}">
-                <a16:creationId xmlns:a16="http://schemas.microsoft.com/office/drawing/2014/main" id="{12726A76-C9B2-5F85-D8EC-16B2CAF82B51}"/>
-              </a:ext>
-            </a:extLst>
-          </p:cNvPr>
+          <p:cNvPr id="4" name="Content Placeholder 3"/>
           <p:cNvSpPr>
             <a:spLocks noGrp="1"/>
           </p:cNvSpPr>
@@ -1611,8 +1419,8 @@
         </p:nvSpPr>
         <p:spPr>
           <a:xfrm>
-            <a:off x="839788" y="2505075"/>
-            <a:ext cx="5157787" cy="3684588"/>
+            <a:off x="340071" y="1102349"/>
+            <a:ext cx="2088635" cy="1621390"/>
           </a:xfrm>
         </p:spPr>
         <p:txBody>
@@ -1652,18 +1460,13 @@
               <a:rPr lang="en-US"/>
               <a:t>Fifth level</a:t>
             </a:r>
-          </a:p>
-        </p:txBody>
-      </p:sp>
-      <p:sp>
-        <p:nvSpPr>
-          <p:cNvPr id="5" name="Text Placeholder 4">
-            <a:extLst>
-              <a:ext uri="{FF2B5EF4-FFF2-40B4-BE49-F238E27FC236}">
-                <a16:creationId xmlns:a16="http://schemas.microsoft.com/office/drawing/2014/main" id="{519D1EE5-FDA5-0447-C083-E05B06734261}"/>
-              </a:ext>
-            </a:extLst>
-          </p:cNvPr>
+            <a:endParaRPr lang="en-US" dirty="0"/>
+          </a:p>
+        </p:txBody>
+      </p:sp>
+      <p:sp>
+        <p:nvSpPr>
+          <p:cNvPr id="5" name="Text Placeholder 4"/>
           <p:cNvSpPr>
             <a:spLocks noGrp="1"/>
           </p:cNvSpPr>
@@ -1673,8 +1476,8 @@
         </p:nvSpPr>
         <p:spPr>
           <a:xfrm>
-            <a:off x="6172200" y="1681163"/>
-            <a:ext cx="5183188" cy="823912"/>
+            <a:off x="2499420" y="739790"/>
+            <a:ext cx="2098921" cy="362559"/>
           </a:xfrm>
         </p:spPr>
         <p:txBody>
@@ -1682,39 +1485,39 @@
           <a:lstStyle>
             <a:lvl1pPr marL="0" indent="0">
               <a:buNone/>
-              <a:defRPr sz="2400" b="1"/>
+              <a:defRPr sz="972" b="1"/>
             </a:lvl1pPr>
-            <a:lvl2pPr marL="457200" indent="0">
-              <a:buNone/>
-              <a:defRPr sz="2000" b="1"/>
+            <a:lvl2pPr marL="185120" indent="0">
+              <a:buNone/>
+              <a:defRPr sz="810" b="1"/>
             </a:lvl2pPr>
-            <a:lvl3pPr marL="914400" indent="0">
-              <a:buNone/>
-              <a:defRPr sz="1800" b="1"/>
+            <a:lvl3pPr marL="370241" indent="0">
+              <a:buNone/>
+              <a:defRPr sz="729" b="1"/>
             </a:lvl3pPr>
-            <a:lvl4pPr marL="1371600" indent="0">
-              <a:buNone/>
-              <a:defRPr sz="1600" b="1"/>
+            <a:lvl4pPr marL="555361" indent="0">
+              <a:buNone/>
+              <a:defRPr sz="648" b="1"/>
             </a:lvl4pPr>
-            <a:lvl5pPr marL="1828800" indent="0">
-              <a:buNone/>
-              <a:defRPr sz="1600" b="1"/>
+            <a:lvl5pPr marL="740481" indent="0">
+              <a:buNone/>
+              <a:defRPr sz="648" b="1"/>
             </a:lvl5pPr>
-            <a:lvl6pPr marL="2286000" indent="0">
-              <a:buNone/>
-              <a:defRPr sz="1600" b="1"/>
+            <a:lvl6pPr marL="925601" indent="0">
+              <a:buNone/>
+              <a:defRPr sz="648" b="1"/>
             </a:lvl6pPr>
-            <a:lvl7pPr marL="2743200" indent="0">
-              <a:buNone/>
-              <a:defRPr sz="1600" b="1"/>
+            <a:lvl7pPr marL="1110722" indent="0">
+              <a:buNone/>
+              <a:defRPr sz="648" b="1"/>
             </a:lvl7pPr>
-            <a:lvl8pPr marL="3200400" indent="0">
-              <a:buNone/>
-              <a:defRPr sz="1600" b="1"/>
+            <a:lvl8pPr marL="1295842" indent="0">
+              <a:buNone/>
+              <a:defRPr sz="648" b="1"/>
             </a:lvl8pPr>
-            <a:lvl9pPr marL="3657600" indent="0">
-              <a:buNone/>
-              <a:defRPr sz="1600" b="1"/>
+            <a:lvl9pPr marL="1480962" indent="0">
+              <a:buNone/>
+              <a:defRPr sz="648" b="1"/>
             </a:lvl9pPr>
           </a:lstStyle>
           <a:p>
@@ -1728,13 +1531,7 @@
       </p:sp>
       <p:sp>
         <p:nvSpPr>
-          <p:cNvPr id="6" name="Content Placeholder 5">
-            <a:extLst>
-              <a:ext uri="{FF2B5EF4-FFF2-40B4-BE49-F238E27FC236}">
-                <a16:creationId xmlns:a16="http://schemas.microsoft.com/office/drawing/2014/main" id="{3C5B6231-20F6-4689-929C-CA4B1ECFADEE}"/>
-              </a:ext>
-            </a:extLst>
-          </p:cNvPr>
+          <p:cNvPr id="6" name="Content Placeholder 5"/>
           <p:cNvSpPr>
             <a:spLocks noGrp="1"/>
           </p:cNvSpPr>
@@ -1744,8 +1541,8 @@
         </p:nvSpPr>
         <p:spPr>
           <a:xfrm>
-            <a:off x="6172200" y="2505075"/>
-            <a:ext cx="5183188" cy="3684588"/>
+            <a:off x="2499420" y="1102349"/>
+            <a:ext cx="2098921" cy="1621390"/>
           </a:xfrm>
         </p:spPr>
         <p:txBody>
@@ -1785,18 +1582,13 @@
               <a:rPr lang="en-US"/>
               <a:t>Fifth level</a:t>
             </a:r>
-          </a:p>
-        </p:txBody>
-      </p:sp>
-      <p:sp>
-        <p:nvSpPr>
-          <p:cNvPr id="7" name="Date Placeholder 6">
-            <a:extLst>
-              <a:ext uri="{FF2B5EF4-FFF2-40B4-BE49-F238E27FC236}">
-                <a16:creationId xmlns:a16="http://schemas.microsoft.com/office/drawing/2014/main" id="{D15A9266-A418-7932-A0BA-56DE48A20E0C}"/>
-              </a:ext>
-            </a:extLst>
-          </p:cNvPr>
+            <a:endParaRPr lang="en-US" dirty="0"/>
+          </a:p>
+        </p:txBody>
+      </p:sp>
+      <p:sp>
+        <p:nvSpPr>
+          <p:cNvPr id="7" name="Date Placeholder 6"/>
           <p:cNvSpPr>
             <a:spLocks noGrp="1"/>
           </p:cNvSpPr>
@@ -1819,13 +1611,7 @@
       </p:sp>
       <p:sp>
         <p:nvSpPr>
-          <p:cNvPr id="8" name="Footer Placeholder 7">
-            <a:extLst>
-              <a:ext uri="{FF2B5EF4-FFF2-40B4-BE49-F238E27FC236}">
-                <a16:creationId xmlns:a16="http://schemas.microsoft.com/office/drawing/2014/main" id="{272A15E2-79C7-4A01-3857-D3718CEB95DF}"/>
-              </a:ext>
-            </a:extLst>
-          </p:cNvPr>
+          <p:cNvPr id="8" name="Footer Placeholder 7"/>
           <p:cNvSpPr>
             <a:spLocks noGrp="1"/>
           </p:cNvSpPr>
@@ -1844,13 +1630,7 @@
       </p:sp>
       <p:sp>
         <p:nvSpPr>
-          <p:cNvPr id="9" name="Slide Number Placeholder 8">
-            <a:extLst>
-              <a:ext uri="{FF2B5EF4-FFF2-40B4-BE49-F238E27FC236}">
-                <a16:creationId xmlns:a16="http://schemas.microsoft.com/office/drawing/2014/main" id="{8FA73BCC-ED65-5D7F-9859-B5F0D16593F2}"/>
-              </a:ext>
-            </a:extLst>
-          </p:cNvPr>
+          <p:cNvPr id="9" name="Slide Number Placeholder 8"/>
           <p:cNvSpPr>
             <a:spLocks noGrp="1"/>
           </p:cNvSpPr>
@@ -1874,7 +1654,7 @@
     </p:spTree>
     <p:extLst>
       <p:ext uri="{BB962C8B-B14F-4D97-AF65-F5344CB8AC3E}">
-        <p14:creationId xmlns:p14="http://schemas.microsoft.com/office/powerpoint/2010/main" val="3843684043"/>
+        <p14:creationId xmlns:p14="http://schemas.microsoft.com/office/powerpoint/2010/main" val="603324508"/>
       </p:ext>
     </p:extLst>
   </p:cSld>
@@ -1903,13 +1683,7 @@
       </p:grpSpPr>
       <p:sp>
         <p:nvSpPr>
-          <p:cNvPr id="2" name="Title 1">
-            <a:extLst>
-              <a:ext uri="{FF2B5EF4-FFF2-40B4-BE49-F238E27FC236}">
-                <a16:creationId xmlns:a16="http://schemas.microsoft.com/office/drawing/2014/main" id="{4DB6D281-EA3F-1A3D-100F-A58D2505BD7F}"/>
-              </a:ext>
-            </a:extLst>
-          </p:cNvPr>
+          <p:cNvPr id="2" name="Title 1"/>
           <p:cNvSpPr>
             <a:spLocks noGrp="1"/>
           </p:cNvSpPr>
@@ -1926,18 +1700,13 @@
               <a:rPr lang="en-US"/>
               <a:t>Click to edit Master title style</a:t>
             </a:r>
-          </a:p>
-        </p:txBody>
-      </p:sp>
-      <p:sp>
-        <p:nvSpPr>
-          <p:cNvPr id="3" name="Date Placeholder 2">
-            <a:extLst>
-              <a:ext uri="{FF2B5EF4-FFF2-40B4-BE49-F238E27FC236}">
-                <a16:creationId xmlns:a16="http://schemas.microsoft.com/office/drawing/2014/main" id="{65C732E7-6B5A-3915-7F87-139DD45801CB}"/>
-              </a:ext>
-            </a:extLst>
-          </p:cNvPr>
+            <a:endParaRPr lang="en-US" dirty="0"/>
+          </a:p>
+        </p:txBody>
+      </p:sp>
+      <p:sp>
+        <p:nvSpPr>
+          <p:cNvPr id="3" name="Date Placeholder 2"/>
           <p:cNvSpPr>
             <a:spLocks noGrp="1"/>
           </p:cNvSpPr>
@@ -1960,13 +1729,7 @@
       </p:sp>
       <p:sp>
         <p:nvSpPr>
-          <p:cNvPr id="4" name="Footer Placeholder 3">
-            <a:extLst>
-              <a:ext uri="{FF2B5EF4-FFF2-40B4-BE49-F238E27FC236}">
-                <a16:creationId xmlns:a16="http://schemas.microsoft.com/office/drawing/2014/main" id="{18E97FD1-2A64-5C46-A84D-513C07C6BCA2}"/>
-              </a:ext>
-            </a:extLst>
-          </p:cNvPr>
+          <p:cNvPr id="4" name="Footer Placeholder 3"/>
           <p:cNvSpPr>
             <a:spLocks noGrp="1"/>
           </p:cNvSpPr>
@@ -1985,13 +1748,7 @@
       </p:sp>
       <p:sp>
         <p:nvSpPr>
-          <p:cNvPr id="5" name="Slide Number Placeholder 4">
-            <a:extLst>
-              <a:ext uri="{FF2B5EF4-FFF2-40B4-BE49-F238E27FC236}">
-                <a16:creationId xmlns:a16="http://schemas.microsoft.com/office/drawing/2014/main" id="{5180301F-C741-DA9A-D4E2-A8CC3D03C14E}"/>
-              </a:ext>
-            </a:extLst>
-          </p:cNvPr>
+          <p:cNvPr id="5" name="Slide Number Placeholder 4"/>
           <p:cNvSpPr>
             <a:spLocks noGrp="1"/>
           </p:cNvSpPr>
@@ -2015,7 +1772,7 @@
     </p:spTree>
     <p:extLst>
       <p:ext uri="{BB962C8B-B14F-4D97-AF65-F5344CB8AC3E}">
-        <p14:creationId xmlns:p14="http://schemas.microsoft.com/office/powerpoint/2010/main" val="1106453667"/>
+        <p14:creationId xmlns:p14="http://schemas.microsoft.com/office/powerpoint/2010/main" val="7463559"/>
       </p:ext>
     </p:extLst>
   </p:cSld>
@@ -2044,13 +1801,7 @@
       </p:grpSpPr>
       <p:sp>
         <p:nvSpPr>
-          <p:cNvPr id="2" name="Date Placeholder 1">
-            <a:extLst>
-              <a:ext uri="{FF2B5EF4-FFF2-40B4-BE49-F238E27FC236}">
-                <a16:creationId xmlns:a16="http://schemas.microsoft.com/office/drawing/2014/main" id="{B8D746DB-3D3E-6628-37F2-05BC814ED19C}"/>
-              </a:ext>
-            </a:extLst>
-          </p:cNvPr>
+          <p:cNvPr id="2" name="Date Placeholder 1"/>
           <p:cNvSpPr>
             <a:spLocks noGrp="1"/>
           </p:cNvSpPr>
@@ -2073,13 +1824,7 @@
       </p:sp>
       <p:sp>
         <p:nvSpPr>
-          <p:cNvPr id="3" name="Footer Placeholder 2">
-            <a:extLst>
-              <a:ext uri="{FF2B5EF4-FFF2-40B4-BE49-F238E27FC236}">
-                <a16:creationId xmlns:a16="http://schemas.microsoft.com/office/drawing/2014/main" id="{3EFE376B-0AB1-93D0-0491-77700C8F87EF}"/>
-              </a:ext>
-            </a:extLst>
-          </p:cNvPr>
+          <p:cNvPr id="3" name="Footer Placeholder 2"/>
           <p:cNvSpPr>
             <a:spLocks noGrp="1"/>
           </p:cNvSpPr>
@@ -2098,13 +1843,7 @@
       </p:sp>
       <p:sp>
         <p:nvSpPr>
-          <p:cNvPr id="4" name="Slide Number Placeholder 3">
-            <a:extLst>
-              <a:ext uri="{FF2B5EF4-FFF2-40B4-BE49-F238E27FC236}">
-                <a16:creationId xmlns:a16="http://schemas.microsoft.com/office/drawing/2014/main" id="{A2C8F0DA-23AB-170C-3CC0-4241765055E4}"/>
-              </a:ext>
-            </a:extLst>
-          </p:cNvPr>
+          <p:cNvPr id="4" name="Slide Number Placeholder 3"/>
           <p:cNvSpPr>
             <a:spLocks noGrp="1"/>
           </p:cNvSpPr>
@@ -2128,7 +1867,7 @@
     </p:spTree>
     <p:extLst>
       <p:ext uri="{BB962C8B-B14F-4D97-AF65-F5344CB8AC3E}">
-        <p14:creationId xmlns:p14="http://schemas.microsoft.com/office/powerpoint/2010/main" val="855820454"/>
+        <p14:creationId xmlns:p14="http://schemas.microsoft.com/office/powerpoint/2010/main" val="2246057899"/>
       </p:ext>
     </p:extLst>
   </p:cSld>
@@ -2157,13 +1896,7 @@
       </p:grpSpPr>
       <p:sp>
         <p:nvSpPr>
-          <p:cNvPr id="2" name="Title 1">
-            <a:extLst>
-              <a:ext uri="{FF2B5EF4-FFF2-40B4-BE49-F238E27FC236}">
-                <a16:creationId xmlns:a16="http://schemas.microsoft.com/office/drawing/2014/main" id="{68BCD43C-5DBA-BFDF-F84F-37631F5581A1}"/>
-              </a:ext>
-            </a:extLst>
-          </p:cNvPr>
+          <p:cNvPr id="2" name="Title 1"/>
           <p:cNvSpPr>
             <a:spLocks noGrp="1"/>
           </p:cNvSpPr>
@@ -2173,15 +1906,15 @@
         </p:nvSpPr>
         <p:spPr>
           <a:xfrm>
-            <a:off x="839788" y="457200"/>
-            <a:ext cx="3932237" cy="1600200"/>
+            <a:off x="340071" y="201189"/>
+            <a:ext cx="1592351" cy="704162"/>
           </a:xfrm>
         </p:spPr>
         <p:txBody>
           <a:bodyPr anchor="b"/>
           <a:lstStyle>
             <a:lvl1pPr>
-              <a:defRPr sz="3200"/>
+              <a:defRPr sz="1296"/>
             </a:lvl1pPr>
           </a:lstStyle>
           <a:p>
@@ -2189,18 +1922,13 @@
               <a:rPr lang="en-US"/>
               <a:t>Click to edit Master title style</a:t>
             </a:r>
-          </a:p>
-        </p:txBody>
-      </p:sp>
-      <p:sp>
-        <p:nvSpPr>
-          <p:cNvPr id="3" name="Content Placeholder 2">
-            <a:extLst>
-              <a:ext uri="{FF2B5EF4-FFF2-40B4-BE49-F238E27FC236}">
-                <a16:creationId xmlns:a16="http://schemas.microsoft.com/office/drawing/2014/main" id="{343268F8-7B75-B6EC-2D00-D9BAA4172B7A}"/>
-              </a:ext>
-            </a:extLst>
-          </p:cNvPr>
+            <a:endParaRPr lang="en-US" dirty="0"/>
+          </a:p>
+        </p:txBody>
+      </p:sp>
+      <p:sp>
+        <p:nvSpPr>
+          <p:cNvPr id="3" name="Content Placeholder 2"/>
           <p:cNvSpPr>
             <a:spLocks noGrp="1"/>
           </p:cNvSpPr>
@@ -2210,39 +1938,39 @@
         </p:nvSpPr>
         <p:spPr>
           <a:xfrm>
-            <a:off x="5183188" y="987425"/>
-            <a:ext cx="6172200" cy="4873625"/>
+            <a:off x="2098921" y="434513"/>
+            <a:ext cx="2499420" cy="2144621"/>
           </a:xfrm>
         </p:spPr>
         <p:txBody>
           <a:bodyPr/>
           <a:lstStyle>
             <a:lvl1pPr>
-              <a:defRPr sz="3200"/>
+              <a:defRPr sz="1296"/>
             </a:lvl1pPr>
             <a:lvl2pPr>
-              <a:defRPr sz="2800"/>
+              <a:defRPr sz="1134"/>
             </a:lvl2pPr>
             <a:lvl3pPr>
-              <a:defRPr sz="2400"/>
+              <a:defRPr sz="972"/>
             </a:lvl3pPr>
             <a:lvl4pPr>
-              <a:defRPr sz="2000"/>
+              <a:defRPr sz="810"/>
             </a:lvl4pPr>
             <a:lvl5pPr>
-              <a:defRPr sz="2000"/>
+              <a:defRPr sz="810"/>
             </a:lvl5pPr>
             <a:lvl6pPr>
-              <a:defRPr sz="2000"/>
+              <a:defRPr sz="810"/>
             </a:lvl6pPr>
             <a:lvl7pPr>
-              <a:defRPr sz="2000"/>
+              <a:defRPr sz="810"/>
             </a:lvl7pPr>
             <a:lvl8pPr>
-              <a:defRPr sz="2000"/>
+              <a:defRPr sz="810"/>
             </a:lvl8pPr>
             <a:lvl9pPr>
-              <a:defRPr sz="2000"/>
+              <a:defRPr sz="810"/>
             </a:lvl9pPr>
           </a:lstStyle>
           <a:p>
@@ -2279,18 +2007,13 @@
               <a:rPr lang="en-US"/>
               <a:t>Fifth level</a:t>
             </a:r>
-          </a:p>
-        </p:txBody>
-      </p:sp>
-      <p:sp>
-        <p:nvSpPr>
-          <p:cNvPr id="4" name="Text Placeholder 3">
-            <a:extLst>
-              <a:ext uri="{FF2B5EF4-FFF2-40B4-BE49-F238E27FC236}">
-                <a16:creationId xmlns:a16="http://schemas.microsoft.com/office/drawing/2014/main" id="{4F10F6F3-DADD-7AAA-1FA2-53ECEABF4CC0}"/>
-              </a:ext>
-            </a:extLst>
-          </p:cNvPr>
+            <a:endParaRPr lang="en-US" dirty="0"/>
+          </a:p>
+        </p:txBody>
+      </p:sp>
+      <p:sp>
+        <p:nvSpPr>
+          <p:cNvPr id="4" name="Text Placeholder 3"/>
           <p:cNvSpPr>
             <a:spLocks noGrp="1"/>
           </p:cNvSpPr>
@@ -2300,8 +2023,8 @@
         </p:nvSpPr>
         <p:spPr>
           <a:xfrm>
-            <a:off x="839788" y="2057400"/>
-            <a:ext cx="3932237" cy="3811588"/>
+            <a:off x="340071" y="905352"/>
+            <a:ext cx="1592351" cy="1677275"/>
           </a:xfrm>
         </p:spPr>
         <p:txBody>
@@ -2309,39 +2032,39 @@
           <a:lstStyle>
             <a:lvl1pPr marL="0" indent="0">
               <a:buNone/>
-              <a:defRPr sz="1600"/>
+              <a:defRPr sz="648"/>
             </a:lvl1pPr>
-            <a:lvl2pPr marL="457200" indent="0">
-              <a:buNone/>
-              <a:defRPr sz="1400"/>
+            <a:lvl2pPr marL="185120" indent="0">
+              <a:buNone/>
+              <a:defRPr sz="567"/>
             </a:lvl2pPr>
-            <a:lvl3pPr marL="914400" indent="0">
-              <a:buNone/>
-              <a:defRPr sz="1200"/>
+            <a:lvl3pPr marL="370241" indent="0">
+              <a:buNone/>
+              <a:defRPr sz="486"/>
             </a:lvl3pPr>
-            <a:lvl4pPr marL="1371600" indent="0">
-              <a:buNone/>
-              <a:defRPr sz="1000"/>
+            <a:lvl4pPr marL="555361" indent="0">
+              <a:buNone/>
+              <a:defRPr sz="405"/>
             </a:lvl4pPr>
-            <a:lvl5pPr marL="1828800" indent="0">
-              <a:buNone/>
-              <a:defRPr sz="1000"/>
+            <a:lvl5pPr marL="740481" indent="0">
+              <a:buNone/>
+              <a:defRPr sz="405"/>
             </a:lvl5pPr>
-            <a:lvl6pPr marL="2286000" indent="0">
-              <a:buNone/>
-              <a:defRPr sz="1000"/>
+            <a:lvl6pPr marL="925601" indent="0">
+              <a:buNone/>
+              <a:defRPr sz="405"/>
             </a:lvl6pPr>
-            <a:lvl7pPr marL="2743200" indent="0">
-              <a:buNone/>
-              <a:defRPr sz="1000"/>
+            <a:lvl7pPr marL="1110722" indent="0">
+              <a:buNone/>
+              <a:defRPr sz="405"/>
             </a:lvl7pPr>
-            <a:lvl8pPr marL="3200400" indent="0">
-              <a:buNone/>
-              <a:defRPr sz="1000"/>
+            <a:lvl8pPr marL="1295842" indent="0">
+              <a:buNone/>
+              <a:defRPr sz="405"/>
             </a:lvl8pPr>
-            <a:lvl9pPr marL="3657600" indent="0">
-              <a:buNone/>
-              <a:defRPr sz="1000"/>
+            <a:lvl9pPr marL="1480962" indent="0">
+              <a:buNone/>
+              <a:defRPr sz="405"/>
             </a:lvl9pPr>
           </a:lstStyle>
           <a:p>
@@ -2355,13 +2078,7 @@
       </p:sp>
       <p:sp>
         <p:nvSpPr>
-          <p:cNvPr id="5" name="Date Placeholder 4">
-            <a:extLst>
-              <a:ext uri="{FF2B5EF4-FFF2-40B4-BE49-F238E27FC236}">
-                <a16:creationId xmlns:a16="http://schemas.microsoft.com/office/drawing/2014/main" id="{410826F8-D761-20E3-5330-747D72EAA2DD}"/>
-              </a:ext>
-            </a:extLst>
-          </p:cNvPr>
+          <p:cNvPr id="5" name="Date Placeholder 4"/>
           <p:cNvSpPr>
             <a:spLocks noGrp="1"/>
           </p:cNvSpPr>
@@ -2384,13 +2101,7 @@
       </p:sp>
       <p:sp>
         <p:nvSpPr>
-          <p:cNvPr id="6" name="Footer Placeholder 5">
-            <a:extLst>
-              <a:ext uri="{FF2B5EF4-FFF2-40B4-BE49-F238E27FC236}">
-                <a16:creationId xmlns:a16="http://schemas.microsoft.com/office/drawing/2014/main" id="{61B8E7F6-4F6D-0092-3EC5-60E52BCD3121}"/>
-              </a:ext>
-            </a:extLst>
-          </p:cNvPr>
+          <p:cNvPr id="6" name="Footer Placeholder 5"/>
           <p:cNvSpPr>
             <a:spLocks noGrp="1"/>
           </p:cNvSpPr>
@@ -2409,13 +2120,7 @@
       </p:sp>
       <p:sp>
         <p:nvSpPr>
-          <p:cNvPr id="7" name="Slide Number Placeholder 6">
-            <a:extLst>
-              <a:ext uri="{FF2B5EF4-FFF2-40B4-BE49-F238E27FC236}">
-                <a16:creationId xmlns:a16="http://schemas.microsoft.com/office/drawing/2014/main" id="{CAF51E9E-A2E0-6205-D1D6-C5651D203819}"/>
-              </a:ext>
-            </a:extLst>
-          </p:cNvPr>
+          <p:cNvPr id="7" name="Slide Number Placeholder 6"/>
           <p:cNvSpPr>
             <a:spLocks noGrp="1"/>
           </p:cNvSpPr>
@@ -2439,7 +2144,7 @@
     </p:spTree>
     <p:extLst>
       <p:ext uri="{BB962C8B-B14F-4D97-AF65-F5344CB8AC3E}">
-        <p14:creationId xmlns:p14="http://schemas.microsoft.com/office/powerpoint/2010/main" val="655381503"/>
+        <p14:creationId xmlns:p14="http://schemas.microsoft.com/office/powerpoint/2010/main" val="130563470"/>
       </p:ext>
     </p:extLst>
   </p:cSld>
@@ -2468,13 +2173,7 @@
       </p:grpSpPr>
       <p:sp>
         <p:nvSpPr>
-          <p:cNvPr id="2" name="Title 1">
-            <a:extLst>
-              <a:ext uri="{FF2B5EF4-FFF2-40B4-BE49-F238E27FC236}">
-                <a16:creationId xmlns:a16="http://schemas.microsoft.com/office/drawing/2014/main" id="{1A6DFD4E-DC97-C647-F2A7-8C999F733B8C}"/>
-              </a:ext>
-            </a:extLst>
-          </p:cNvPr>
+          <p:cNvPr id="2" name="Title 1"/>
           <p:cNvSpPr>
             <a:spLocks noGrp="1"/>
           </p:cNvSpPr>
@@ -2484,15 +2183,15 @@
         </p:nvSpPr>
         <p:spPr>
           <a:xfrm>
-            <a:off x="839788" y="457200"/>
-            <a:ext cx="3932237" cy="1600200"/>
+            <a:off x="340071" y="201189"/>
+            <a:ext cx="1592351" cy="704162"/>
           </a:xfrm>
         </p:spPr>
         <p:txBody>
           <a:bodyPr anchor="b"/>
           <a:lstStyle>
             <a:lvl1pPr>
-              <a:defRPr sz="3200"/>
+              <a:defRPr sz="1296"/>
             </a:lvl1pPr>
           </a:lstStyle>
           <a:p>
@@ -2500,20 +2199,15 @@
               <a:rPr lang="en-US"/>
               <a:t>Click to edit Master title style</a:t>
             </a:r>
-          </a:p>
-        </p:txBody>
-      </p:sp>
-      <p:sp>
-        <p:nvSpPr>
-          <p:cNvPr id="3" name="Picture Placeholder 2">
-            <a:extLst>
-              <a:ext uri="{FF2B5EF4-FFF2-40B4-BE49-F238E27FC236}">
-                <a16:creationId xmlns:a16="http://schemas.microsoft.com/office/drawing/2014/main" id="{CA30A989-B168-2DE7-07BA-F8CDF71AF9ED}"/>
-              </a:ext>
-            </a:extLst>
-          </p:cNvPr>
-          <p:cNvSpPr>
-            <a:spLocks noGrp="1"/>
+            <a:endParaRPr lang="en-US" dirty="0"/>
+          </a:p>
+        </p:txBody>
+      </p:sp>
+      <p:sp>
+        <p:nvSpPr>
+          <p:cNvPr id="3" name="Picture Placeholder 2"/>
+          <p:cNvSpPr>
+            <a:spLocks noGrp="1" noChangeAspect="1"/>
           </p:cNvSpPr>
           <p:nvPr>
             <p:ph type="pic" idx="1"/>
@@ -2521,64 +2215,62 @@
         </p:nvSpPr>
         <p:spPr>
           <a:xfrm>
-            <a:off x="5183188" y="987425"/>
-            <a:ext cx="6172200" cy="4873625"/>
-          </a:xfrm>
-        </p:spPr>
-        <p:txBody>
-          <a:bodyPr/>
+            <a:off x="2098921" y="434513"/>
+            <a:ext cx="2499420" cy="2144621"/>
+          </a:xfrm>
+        </p:spPr>
+        <p:txBody>
+          <a:bodyPr anchor="t"/>
           <a:lstStyle>
             <a:lvl1pPr marL="0" indent="0">
               <a:buNone/>
-              <a:defRPr sz="3200"/>
+              <a:defRPr sz="1296"/>
             </a:lvl1pPr>
-            <a:lvl2pPr marL="457200" indent="0">
-              <a:buNone/>
-              <a:defRPr sz="2800"/>
+            <a:lvl2pPr marL="185120" indent="0">
+              <a:buNone/>
+              <a:defRPr sz="1134"/>
             </a:lvl2pPr>
-            <a:lvl3pPr marL="914400" indent="0">
-              <a:buNone/>
-              <a:defRPr sz="2400"/>
+            <a:lvl3pPr marL="370241" indent="0">
+              <a:buNone/>
+              <a:defRPr sz="972"/>
             </a:lvl3pPr>
-            <a:lvl4pPr marL="1371600" indent="0">
-              <a:buNone/>
-              <a:defRPr sz="2000"/>
+            <a:lvl4pPr marL="555361" indent="0">
+              <a:buNone/>
+              <a:defRPr sz="810"/>
             </a:lvl4pPr>
-            <a:lvl5pPr marL="1828800" indent="0">
-              <a:buNone/>
-              <a:defRPr sz="2000"/>
+            <a:lvl5pPr marL="740481" indent="0">
+              <a:buNone/>
+              <a:defRPr sz="810"/>
             </a:lvl5pPr>
-            <a:lvl6pPr marL="2286000" indent="0">
-              <a:buNone/>
-              <a:defRPr sz="2000"/>
+            <a:lvl6pPr marL="925601" indent="0">
+              <a:buNone/>
+              <a:defRPr sz="810"/>
             </a:lvl6pPr>
-            <a:lvl7pPr marL="2743200" indent="0">
-              <a:buNone/>
-              <a:defRPr sz="2000"/>
+            <a:lvl7pPr marL="1110722" indent="0">
+              <a:buNone/>
+              <a:defRPr sz="810"/>
             </a:lvl7pPr>
-            <a:lvl8pPr marL="3200400" indent="0">
-              <a:buNone/>
-              <a:defRPr sz="2000"/>
+            <a:lvl8pPr marL="1295842" indent="0">
+              <a:buNone/>
+              <a:defRPr sz="810"/>
             </a:lvl8pPr>
-            <a:lvl9pPr marL="3657600" indent="0">
-              <a:buNone/>
-              <a:defRPr sz="2000"/>
+            <a:lvl9pPr marL="1480962" indent="0">
+              <a:buNone/>
+              <a:defRPr sz="810"/>
             </a:lvl9pPr>
           </a:lstStyle>
           <a:p>
-            <a:endParaRPr lang="en-US"/>
-          </a:p>
-        </p:txBody>
-      </p:sp>
-      <p:sp>
-        <p:nvSpPr>
-          <p:cNvPr id="4" name="Text Placeholder 3">
-            <a:extLst>
-              <a:ext uri="{FF2B5EF4-FFF2-40B4-BE49-F238E27FC236}">
-                <a16:creationId xmlns:a16="http://schemas.microsoft.com/office/drawing/2014/main" id="{665EB90A-A550-8180-7BDF-584E032E5002}"/>
-              </a:ext>
-            </a:extLst>
-          </p:cNvPr>
+            <a:r>
+              <a:rPr lang="en-US"/>
+              <a:t>Click icon to add picture</a:t>
+            </a:r>
+            <a:endParaRPr lang="en-US" dirty="0"/>
+          </a:p>
+        </p:txBody>
+      </p:sp>
+      <p:sp>
+        <p:nvSpPr>
+          <p:cNvPr id="4" name="Text Placeholder 3"/>
           <p:cNvSpPr>
             <a:spLocks noGrp="1"/>
           </p:cNvSpPr>
@@ -2588,8 +2280,8 @@
         </p:nvSpPr>
         <p:spPr>
           <a:xfrm>
-            <a:off x="839788" y="2057400"/>
-            <a:ext cx="3932237" cy="3811588"/>
+            <a:off x="340071" y="905352"/>
+            <a:ext cx="1592351" cy="1677275"/>
           </a:xfrm>
         </p:spPr>
         <p:txBody>
@@ -2597,39 +2289,39 @@
           <a:lstStyle>
             <a:lvl1pPr marL="0" indent="0">
               <a:buNone/>
-              <a:defRPr sz="1600"/>
+              <a:defRPr sz="648"/>
             </a:lvl1pPr>
-            <a:lvl2pPr marL="457200" indent="0">
-              <a:buNone/>
-              <a:defRPr sz="1400"/>
+            <a:lvl2pPr marL="185120" indent="0">
+              <a:buNone/>
+              <a:defRPr sz="567"/>
             </a:lvl2pPr>
-            <a:lvl3pPr marL="914400" indent="0">
-              <a:buNone/>
-              <a:defRPr sz="1200"/>
+            <a:lvl3pPr marL="370241" indent="0">
+              <a:buNone/>
+              <a:defRPr sz="486"/>
             </a:lvl3pPr>
-            <a:lvl4pPr marL="1371600" indent="0">
-              <a:buNone/>
-              <a:defRPr sz="1000"/>
+            <a:lvl4pPr marL="555361" indent="0">
+              <a:buNone/>
+              <a:defRPr sz="405"/>
             </a:lvl4pPr>
-            <a:lvl5pPr marL="1828800" indent="0">
-              <a:buNone/>
-              <a:defRPr sz="1000"/>
+            <a:lvl5pPr marL="740481" indent="0">
+              <a:buNone/>
+              <a:defRPr sz="405"/>
             </a:lvl5pPr>
-            <a:lvl6pPr marL="2286000" indent="0">
-              <a:buNone/>
-              <a:defRPr sz="1000"/>
+            <a:lvl6pPr marL="925601" indent="0">
+              <a:buNone/>
+              <a:defRPr sz="405"/>
             </a:lvl6pPr>
-            <a:lvl7pPr marL="2743200" indent="0">
-              <a:buNone/>
-              <a:defRPr sz="1000"/>
+            <a:lvl7pPr marL="1110722" indent="0">
+              <a:buNone/>
+              <a:defRPr sz="405"/>
             </a:lvl7pPr>
-            <a:lvl8pPr marL="3200400" indent="0">
-              <a:buNone/>
-              <a:defRPr sz="1000"/>
+            <a:lvl8pPr marL="1295842" indent="0">
+              <a:buNone/>
+              <a:defRPr sz="405"/>
             </a:lvl8pPr>
-            <a:lvl9pPr marL="3657600" indent="0">
-              <a:buNone/>
-              <a:defRPr sz="1000"/>
+            <a:lvl9pPr marL="1480962" indent="0">
+              <a:buNone/>
+              <a:defRPr sz="405"/>
             </a:lvl9pPr>
           </a:lstStyle>
           <a:p>
@@ -2643,13 +2335,7 @@
       </p:sp>
       <p:sp>
         <p:nvSpPr>
-          <p:cNvPr id="5" name="Date Placeholder 4">
-            <a:extLst>
-              <a:ext uri="{FF2B5EF4-FFF2-40B4-BE49-F238E27FC236}">
-                <a16:creationId xmlns:a16="http://schemas.microsoft.com/office/drawing/2014/main" id="{8886E57A-55C9-5371-C13D-808CF6B279DF}"/>
-              </a:ext>
-            </a:extLst>
-          </p:cNvPr>
+          <p:cNvPr id="5" name="Date Placeholder 4"/>
           <p:cNvSpPr>
             <a:spLocks noGrp="1"/>
           </p:cNvSpPr>
@@ -2672,13 +2358,7 @@
       </p:sp>
       <p:sp>
         <p:nvSpPr>
-          <p:cNvPr id="6" name="Footer Placeholder 5">
-            <a:extLst>
-              <a:ext uri="{FF2B5EF4-FFF2-40B4-BE49-F238E27FC236}">
-                <a16:creationId xmlns:a16="http://schemas.microsoft.com/office/drawing/2014/main" id="{A4770261-648D-94DE-BCBD-424CD9F3EC72}"/>
-              </a:ext>
-            </a:extLst>
-          </p:cNvPr>
+          <p:cNvPr id="6" name="Footer Placeholder 5"/>
           <p:cNvSpPr>
             <a:spLocks noGrp="1"/>
           </p:cNvSpPr>
@@ -2697,13 +2377,7 @@
       </p:sp>
       <p:sp>
         <p:nvSpPr>
-          <p:cNvPr id="7" name="Slide Number Placeholder 6">
-            <a:extLst>
-              <a:ext uri="{FF2B5EF4-FFF2-40B4-BE49-F238E27FC236}">
-                <a16:creationId xmlns:a16="http://schemas.microsoft.com/office/drawing/2014/main" id="{C43C7E66-80C0-7B4A-D3C1-9BEF730F8ACD}"/>
-              </a:ext>
-            </a:extLst>
-          </p:cNvPr>
+          <p:cNvPr id="7" name="Slide Number Placeholder 6"/>
           <p:cNvSpPr>
             <a:spLocks noGrp="1"/>
           </p:cNvSpPr>
@@ -2727,7 +2401,7 @@
     </p:spTree>
     <p:extLst>
       <p:ext uri="{BB962C8B-B14F-4D97-AF65-F5344CB8AC3E}">
-        <p14:creationId xmlns:p14="http://schemas.microsoft.com/office/powerpoint/2010/main" val="2839862493"/>
+        <p14:creationId xmlns:p14="http://schemas.microsoft.com/office/powerpoint/2010/main" val="3672545459"/>
       </p:ext>
     </p:extLst>
   </p:cSld>
@@ -2761,13 +2435,7 @@
       </p:grpSpPr>
       <p:sp>
         <p:nvSpPr>
-          <p:cNvPr id="2" name="Title Placeholder 1">
-            <a:extLst>
-              <a:ext uri="{FF2B5EF4-FFF2-40B4-BE49-F238E27FC236}">
-                <a16:creationId xmlns:a16="http://schemas.microsoft.com/office/drawing/2014/main" id="{36F4E77D-9CE5-BE31-E87B-DC33166B4409}"/>
-              </a:ext>
-            </a:extLst>
-          </p:cNvPr>
+          <p:cNvPr id="2" name="Title Placeholder 1"/>
           <p:cNvSpPr>
             <a:spLocks noGrp="1"/>
           </p:cNvSpPr>
@@ -2777,8 +2445,8 @@
         </p:nvSpPr>
         <p:spPr>
           <a:xfrm>
-            <a:off x="838200" y="365125"/>
-            <a:ext cx="10515600" cy="1325563"/>
+            <a:off x="339428" y="160672"/>
+            <a:ext cx="4258270" cy="583309"/>
           </a:xfrm>
           <a:prstGeom prst="rect">
             <a:avLst/>
@@ -2794,18 +2462,13 @@
               <a:rPr lang="en-US"/>
               <a:t>Click to edit Master title style</a:t>
             </a:r>
-          </a:p>
-        </p:txBody>
-      </p:sp>
-      <p:sp>
-        <p:nvSpPr>
-          <p:cNvPr id="3" name="Text Placeholder 2">
-            <a:extLst>
-              <a:ext uri="{FF2B5EF4-FFF2-40B4-BE49-F238E27FC236}">
-                <a16:creationId xmlns:a16="http://schemas.microsoft.com/office/drawing/2014/main" id="{EC699E51-3EAF-88F4-E0DB-287A59E3E5D2}"/>
-              </a:ext>
-            </a:extLst>
-          </p:cNvPr>
+            <a:endParaRPr lang="en-US" dirty="0"/>
+          </a:p>
+        </p:txBody>
+      </p:sp>
+      <p:sp>
+        <p:nvSpPr>
+          <p:cNvPr id="3" name="Text Placeholder 2"/>
           <p:cNvSpPr>
             <a:spLocks noGrp="1"/>
           </p:cNvSpPr>
@@ -2815,8 +2478,8 @@
         </p:nvSpPr>
         <p:spPr>
           <a:xfrm>
-            <a:off x="838200" y="1825625"/>
-            <a:ext cx="10515600" cy="4351338"/>
+            <a:off x="339428" y="803360"/>
+            <a:ext cx="4258270" cy="1914790"/>
           </a:xfrm>
           <a:prstGeom prst="rect">
             <a:avLst/>
@@ -2861,18 +2524,13 @@
               <a:rPr lang="en-US"/>
               <a:t>Fifth level</a:t>
             </a:r>
-          </a:p>
-        </p:txBody>
-      </p:sp>
-      <p:sp>
-        <p:nvSpPr>
-          <p:cNvPr id="4" name="Date Placeholder 3">
-            <a:extLst>
-              <a:ext uri="{FF2B5EF4-FFF2-40B4-BE49-F238E27FC236}">
-                <a16:creationId xmlns:a16="http://schemas.microsoft.com/office/drawing/2014/main" id="{7B6A3C07-39D6-13C5-A033-46B93994BC2F}"/>
-              </a:ext>
-            </a:extLst>
-          </p:cNvPr>
+            <a:endParaRPr lang="en-US" dirty="0"/>
+          </a:p>
+        </p:txBody>
+      </p:sp>
+      <p:sp>
+        <p:nvSpPr>
+          <p:cNvPr id="4" name="Date Placeholder 3"/>
           <p:cNvSpPr>
             <a:spLocks noGrp="1"/>
           </p:cNvSpPr>
@@ -2882,8 +2540,8 @@
         </p:nvSpPr>
         <p:spPr>
           <a:xfrm>
-            <a:off x="838200" y="6356350"/>
-            <a:ext cx="2743200" cy="365125"/>
+            <a:off x="339427" y="2797089"/>
+            <a:ext cx="1110853" cy="160672"/>
           </a:xfrm>
           <a:prstGeom prst="rect">
             <a:avLst/>
@@ -2893,7 +2551,7 @@
           <a:bodyPr vert="horz" lIns="91440" tIns="45720" rIns="91440" bIns="45720" rtlCol="0" anchor="ctr"/>
           <a:lstStyle>
             <a:lvl1pPr algn="l">
-              <a:defRPr sz="1200">
+              <a:defRPr sz="486">
                 <a:solidFill>
                   <a:schemeClr val="tx1">
                     <a:tint val="82000"/>
@@ -2913,13 +2571,7 @@
       </p:sp>
       <p:sp>
         <p:nvSpPr>
-          <p:cNvPr id="5" name="Footer Placeholder 4">
-            <a:extLst>
-              <a:ext uri="{FF2B5EF4-FFF2-40B4-BE49-F238E27FC236}">
-                <a16:creationId xmlns:a16="http://schemas.microsoft.com/office/drawing/2014/main" id="{BAF241BD-63CF-89D9-6996-3B8317BD3410}"/>
-              </a:ext>
-            </a:extLst>
-          </p:cNvPr>
+          <p:cNvPr id="5" name="Footer Placeholder 4"/>
           <p:cNvSpPr>
             <a:spLocks noGrp="1"/>
           </p:cNvSpPr>
@@ -2929,8 +2581,8 @@
         </p:nvSpPr>
         <p:spPr>
           <a:xfrm>
-            <a:off x="4038600" y="6356350"/>
-            <a:ext cx="4114800" cy="365125"/>
+            <a:off x="1635423" y="2797089"/>
+            <a:ext cx="1666280" cy="160672"/>
           </a:xfrm>
           <a:prstGeom prst="rect">
             <a:avLst/>
@@ -2940,7 +2592,7 @@
           <a:bodyPr vert="horz" lIns="91440" tIns="45720" rIns="91440" bIns="45720" rtlCol="0" anchor="ctr"/>
           <a:lstStyle>
             <a:lvl1pPr algn="ctr">
-              <a:defRPr sz="1200">
+              <a:defRPr sz="486">
                 <a:solidFill>
                   <a:schemeClr val="tx1">
                     <a:tint val="82000"/>
@@ -2956,13 +2608,7 @@
       </p:sp>
       <p:sp>
         <p:nvSpPr>
-          <p:cNvPr id="6" name="Slide Number Placeholder 5">
-            <a:extLst>
-              <a:ext uri="{FF2B5EF4-FFF2-40B4-BE49-F238E27FC236}">
-                <a16:creationId xmlns:a16="http://schemas.microsoft.com/office/drawing/2014/main" id="{D917C665-67C6-6EEE-18B2-DFBE391D9827}"/>
-              </a:ext>
-            </a:extLst>
-          </p:cNvPr>
+          <p:cNvPr id="6" name="Slide Number Placeholder 5"/>
           <p:cNvSpPr>
             <a:spLocks noGrp="1"/>
           </p:cNvSpPr>
@@ -2972,8 +2618,8 @@
         </p:nvSpPr>
         <p:spPr>
           <a:xfrm>
-            <a:off x="8610600" y="6356350"/>
-            <a:ext cx="2743200" cy="365125"/>
+            <a:off x="3486845" y="2797089"/>
+            <a:ext cx="1110853" cy="160672"/>
           </a:xfrm>
           <a:prstGeom prst="rect">
             <a:avLst/>
@@ -2983,7 +2629,7 @@
           <a:bodyPr vert="horz" lIns="91440" tIns="45720" rIns="91440" bIns="45720" rtlCol="0" anchor="ctr"/>
           <a:lstStyle>
             <a:lvl1pPr algn="r">
-              <a:defRPr sz="1200">
+              <a:defRPr sz="486">
                 <a:solidFill>
                   <a:schemeClr val="tx1">
                     <a:tint val="82000"/>
@@ -3004,27 +2650,27 @@
     </p:spTree>
     <p:extLst>
       <p:ext uri="{BB962C8B-B14F-4D97-AF65-F5344CB8AC3E}">
-        <p14:creationId xmlns:p14="http://schemas.microsoft.com/office/powerpoint/2010/main" val="1952164701"/>
+        <p14:creationId xmlns:p14="http://schemas.microsoft.com/office/powerpoint/2010/main" val="2091236706"/>
       </p:ext>
     </p:extLst>
   </p:cSld>
   <p:clrMap bg1="lt1" tx1="dk1" bg2="lt2" tx2="dk2" accent1="accent1" accent2="accent2" accent3="accent3" accent4="accent4" accent5="accent5" accent6="accent6" hlink="hlink" folHlink="folHlink"/>
   <p:sldLayoutIdLst>
-    <p:sldLayoutId id="2147483649" r:id="rId1"/>
-    <p:sldLayoutId id="2147483650" r:id="rId2"/>
-    <p:sldLayoutId id="2147483651" r:id="rId3"/>
-    <p:sldLayoutId id="2147483652" r:id="rId4"/>
-    <p:sldLayoutId id="2147483653" r:id="rId5"/>
-    <p:sldLayoutId id="2147483654" r:id="rId6"/>
-    <p:sldLayoutId id="2147483655" r:id="rId7"/>
-    <p:sldLayoutId id="2147483656" r:id="rId8"/>
-    <p:sldLayoutId id="2147483657" r:id="rId9"/>
-    <p:sldLayoutId id="2147483658" r:id="rId10"/>
-    <p:sldLayoutId id="2147483659" r:id="rId11"/>
+    <p:sldLayoutId id="2147483733" r:id="rId1"/>
+    <p:sldLayoutId id="2147483734" r:id="rId2"/>
+    <p:sldLayoutId id="2147483735" r:id="rId3"/>
+    <p:sldLayoutId id="2147483736" r:id="rId4"/>
+    <p:sldLayoutId id="2147483737" r:id="rId5"/>
+    <p:sldLayoutId id="2147483738" r:id="rId6"/>
+    <p:sldLayoutId id="2147483739" r:id="rId7"/>
+    <p:sldLayoutId id="2147483740" r:id="rId8"/>
+    <p:sldLayoutId id="2147483741" r:id="rId9"/>
+    <p:sldLayoutId id="2147483742" r:id="rId10"/>
+    <p:sldLayoutId id="2147483743" r:id="rId11"/>
   </p:sldLayoutIdLst>
   <p:txStyles>
     <p:titleStyle>
-      <a:lvl1pPr algn="l" defTabSz="914400" rtl="0" eaLnBrk="1" latinLnBrk="0" hangingPunct="1">
+      <a:lvl1pPr algn="l" defTabSz="370241" rtl="0" eaLnBrk="1" latinLnBrk="0" hangingPunct="1">
         <a:lnSpc>
           <a:spcPct val="90000"/>
         </a:lnSpc>
@@ -3032,7 +2678,7 @@
           <a:spcPct val="0"/>
         </a:spcBef>
         <a:buNone/>
-        <a:defRPr sz="4400" kern="1200">
+        <a:defRPr sz="1782" kern="1200">
           <a:solidFill>
             <a:schemeClr val="tx1"/>
           </a:solidFill>
@@ -3043,16 +2689,16 @@
       </a:lvl1pPr>
     </p:titleStyle>
     <p:bodyStyle>
-      <a:lvl1pPr marL="228600" indent="-228600" algn="l" defTabSz="914400" rtl="0" eaLnBrk="1" latinLnBrk="0" hangingPunct="1">
+      <a:lvl1pPr marL="92560" indent="-92560" algn="l" defTabSz="370241" rtl="0" eaLnBrk="1" latinLnBrk="0" hangingPunct="1">
         <a:lnSpc>
           <a:spcPct val="90000"/>
         </a:lnSpc>
         <a:spcBef>
-          <a:spcPts val="1000"/>
+          <a:spcPts val="405"/>
         </a:spcBef>
         <a:buFont typeface="Arial" panose="020B0604020202020204" pitchFamily="34" charset="0"/>
         <a:buChar char="•"/>
-        <a:defRPr sz="2800" kern="1200">
+        <a:defRPr sz="1134" kern="1200">
           <a:solidFill>
             <a:schemeClr val="tx1"/>
           </a:solidFill>
@@ -3061,16 +2707,16 @@
           <a:cs typeface="+mn-cs"/>
         </a:defRPr>
       </a:lvl1pPr>
-      <a:lvl2pPr marL="685800" indent="-228600" algn="l" defTabSz="914400" rtl="0" eaLnBrk="1" latinLnBrk="0" hangingPunct="1">
+      <a:lvl2pPr marL="277680" indent="-92560" algn="l" defTabSz="370241" rtl="0" eaLnBrk="1" latinLnBrk="0" hangingPunct="1">
         <a:lnSpc>
           <a:spcPct val="90000"/>
         </a:lnSpc>
         <a:spcBef>
-          <a:spcPts val="500"/>
+          <a:spcPts val="202"/>
         </a:spcBef>
         <a:buFont typeface="Arial" panose="020B0604020202020204" pitchFamily="34" charset="0"/>
         <a:buChar char="•"/>
-        <a:defRPr sz="2400" kern="1200">
+        <a:defRPr sz="972" kern="1200">
           <a:solidFill>
             <a:schemeClr val="tx1"/>
           </a:solidFill>
@@ -3079,16 +2725,16 @@
           <a:cs typeface="+mn-cs"/>
         </a:defRPr>
       </a:lvl2pPr>
-      <a:lvl3pPr marL="1143000" indent="-228600" algn="l" defTabSz="914400" rtl="0" eaLnBrk="1" latinLnBrk="0" hangingPunct="1">
+      <a:lvl3pPr marL="462801" indent="-92560" algn="l" defTabSz="370241" rtl="0" eaLnBrk="1" latinLnBrk="0" hangingPunct="1">
         <a:lnSpc>
           <a:spcPct val="90000"/>
         </a:lnSpc>
         <a:spcBef>
-          <a:spcPts val="500"/>
+          <a:spcPts val="202"/>
         </a:spcBef>
         <a:buFont typeface="Arial" panose="020B0604020202020204" pitchFamily="34" charset="0"/>
         <a:buChar char="•"/>
-        <a:defRPr sz="2000" kern="1200">
+        <a:defRPr sz="810" kern="1200">
           <a:solidFill>
             <a:schemeClr val="tx1"/>
           </a:solidFill>
@@ -3097,16 +2743,16 @@
           <a:cs typeface="+mn-cs"/>
         </a:defRPr>
       </a:lvl3pPr>
-      <a:lvl4pPr marL="1600200" indent="-228600" algn="l" defTabSz="914400" rtl="0" eaLnBrk="1" latinLnBrk="0" hangingPunct="1">
+      <a:lvl4pPr marL="647921" indent="-92560" algn="l" defTabSz="370241" rtl="0" eaLnBrk="1" latinLnBrk="0" hangingPunct="1">
         <a:lnSpc>
           <a:spcPct val="90000"/>
         </a:lnSpc>
         <a:spcBef>
-          <a:spcPts val="500"/>
+          <a:spcPts val="202"/>
         </a:spcBef>
         <a:buFont typeface="Arial" panose="020B0604020202020204" pitchFamily="34" charset="0"/>
         <a:buChar char="•"/>
-        <a:defRPr sz="1800" kern="1200">
+        <a:defRPr sz="729" kern="1200">
           <a:solidFill>
             <a:schemeClr val="tx1"/>
           </a:solidFill>
@@ -3115,16 +2761,16 @@
           <a:cs typeface="+mn-cs"/>
         </a:defRPr>
       </a:lvl4pPr>
-      <a:lvl5pPr marL="2057400" indent="-228600" algn="l" defTabSz="914400" rtl="0" eaLnBrk="1" latinLnBrk="0" hangingPunct="1">
+      <a:lvl5pPr marL="833041" indent="-92560" algn="l" defTabSz="370241" rtl="0" eaLnBrk="1" latinLnBrk="0" hangingPunct="1">
         <a:lnSpc>
           <a:spcPct val="90000"/>
         </a:lnSpc>
         <a:spcBef>
-          <a:spcPts val="500"/>
+          <a:spcPts val="202"/>
         </a:spcBef>
         <a:buFont typeface="Arial" panose="020B0604020202020204" pitchFamily="34" charset="0"/>
         <a:buChar char="•"/>
-        <a:defRPr sz="1800" kern="1200">
+        <a:defRPr sz="729" kern="1200">
           <a:solidFill>
             <a:schemeClr val="tx1"/>
           </a:solidFill>
@@ -3133,16 +2779,16 @@
           <a:cs typeface="+mn-cs"/>
         </a:defRPr>
       </a:lvl5pPr>
-      <a:lvl6pPr marL="2514600" indent="-228600" algn="l" defTabSz="914400" rtl="0" eaLnBrk="1" latinLnBrk="0" hangingPunct="1">
+      <a:lvl6pPr marL="1018162" indent="-92560" algn="l" defTabSz="370241" rtl="0" eaLnBrk="1" latinLnBrk="0" hangingPunct="1">
         <a:lnSpc>
           <a:spcPct val="90000"/>
         </a:lnSpc>
         <a:spcBef>
-          <a:spcPts val="500"/>
+          <a:spcPts val="202"/>
         </a:spcBef>
         <a:buFont typeface="Arial" panose="020B0604020202020204" pitchFamily="34" charset="0"/>
         <a:buChar char="•"/>
-        <a:defRPr sz="1800" kern="1200">
+        <a:defRPr sz="729" kern="1200">
           <a:solidFill>
             <a:schemeClr val="tx1"/>
           </a:solidFill>
@@ -3151,16 +2797,16 @@
           <a:cs typeface="+mn-cs"/>
         </a:defRPr>
       </a:lvl6pPr>
-      <a:lvl7pPr marL="2971800" indent="-228600" algn="l" defTabSz="914400" rtl="0" eaLnBrk="1" latinLnBrk="0" hangingPunct="1">
+      <a:lvl7pPr marL="1203282" indent="-92560" algn="l" defTabSz="370241" rtl="0" eaLnBrk="1" latinLnBrk="0" hangingPunct="1">
         <a:lnSpc>
           <a:spcPct val="90000"/>
         </a:lnSpc>
         <a:spcBef>
-          <a:spcPts val="500"/>
+          <a:spcPts val="202"/>
         </a:spcBef>
         <a:buFont typeface="Arial" panose="020B0604020202020204" pitchFamily="34" charset="0"/>
         <a:buChar char="•"/>
-        <a:defRPr sz="1800" kern="1200">
+        <a:defRPr sz="729" kern="1200">
           <a:solidFill>
             <a:schemeClr val="tx1"/>
           </a:solidFill>
@@ -3169,16 +2815,16 @@
           <a:cs typeface="+mn-cs"/>
         </a:defRPr>
       </a:lvl7pPr>
-      <a:lvl8pPr marL="3429000" indent="-228600" algn="l" defTabSz="914400" rtl="0" eaLnBrk="1" latinLnBrk="0" hangingPunct="1">
+      <a:lvl8pPr marL="1388402" indent="-92560" algn="l" defTabSz="370241" rtl="0" eaLnBrk="1" latinLnBrk="0" hangingPunct="1">
         <a:lnSpc>
           <a:spcPct val="90000"/>
         </a:lnSpc>
         <a:spcBef>
-          <a:spcPts val="500"/>
+          <a:spcPts val="202"/>
         </a:spcBef>
         <a:buFont typeface="Arial" panose="020B0604020202020204" pitchFamily="34" charset="0"/>
         <a:buChar char="•"/>
-        <a:defRPr sz="1800" kern="1200">
+        <a:defRPr sz="729" kern="1200">
           <a:solidFill>
             <a:schemeClr val="tx1"/>
           </a:solidFill>
@@ -3187,16 +2833,16 @@
           <a:cs typeface="+mn-cs"/>
         </a:defRPr>
       </a:lvl8pPr>
-      <a:lvl9pPr marL="3886200" indent="-228600" algn="l" defTabSz="914400" rtl="0" eaLnBrk="1" latinLnBrk="0" hangingPunct="1">
+      <a:lvl9pPr marL="1573522" indent="-92560" algn="l" defTabSz="370241" rtl="0" eaLnBrk="1" latinLnBrk="0" hangingPunct="1">
         <a:lnSpc>
           <a:spcPct val="90000"/>
         </a:lnSpc>
         <a:spcBef>
-          <a:spcPts val="500"/>
+          <a:spcPts val="202"/>
         </a:spcBef>
         <a:buFont typeface="Arial" panose="020B0604020202020204" pitchFamily="34" charset="0"/>
         <a:buChar char="•"/>
-        <a:defRPr sz="1800" kern="1200">
+        <a:defRPr sz="729" kern="1200">
           <a:solidFill>
             <a:schemeClr val="tx1"/>
           </a:solidFill>
@@ -3210,8 +2856,8 @@
       <a:defPPr>
         <a:defRPr lang="en-US"/>
       </a:defPPr>
-      <a:lvl1pPr marL="0" algn="l" defTabSz="914400" rtl="0" eaLnBrk="1" latinLnBrk="0" hangingPunct="1">
-        <a:defRPr sz="1800" kern="1200">
+      <a:lvl1pPr marL="0" algn="l" defTabSz="370241" rtl="0" eaLnBrk="1" latinLnBrk="0" hangingPunct="1">
+        <a:defRPr sz="729" kern="1200">
           <a:solidFill>
             <a:schemeClr val="tx1"/>
           </a:solidFill>
@@ -3220,8 +2866,8 @@
           <a:cs typeface="+mn-cs"/>
         </a:defRPr>
       </a:lvl1pPr>
-      <a:lvl2pPr marL="457200" algn="l" defTabSz="914400" rtl="0" eaLnBrk="1" latinLnBrk="0" hangingPunct="1">
-        <a:defRPr sz="1800" kern="1200">
+      <a:lvl2pPr marL="185120" algn="l" defTabSz="370241" rtl="0" eaLnBrk="1" latinLnBrk="0" hangingPunct="1">
+        <a:defRPr sz="729" kern="1200">
           <a:solidFill>
             <a:schemeClr val="tx1"/>
           </a:solidFill>
@@ -3230,8 +2876,8 @@
           <a:cs typeface="+mn-cs"/>
         </a:defRPr>
       </a:lvl2pPr>
-      <a:lvl3pPr marL="914400" algn="l" defTabSz="914400" rtl="0" eaLnBrk="1" latinLnBrk="0" hangingPunct="1">
-        <a:defRPr sz="1800" kern="1200">
+      <a:lvl3pPr marL="370241" algn="l" defTabSz="370241" rtl="0" eaLnBrk="1" latinLnBrk="0" hangingPunct="1">
+        <a:defRPr sz="729" kern="1200">
           <a:solidFill>
             <a:schemeClr val="tx1"/>
           </a:solidFill>
@@ -3240,8 +2886,8 @@
           <a:cs typeface="+mn-cs"/>
         </a:defRPr>
       </a:lvl3pPr>
-      <a:lvl4pPr marL="1371600" algn="l" defTabSz="914400" rtl="0" eaLnBrk="1" latinLnBrk="0" hangingPunct="1">
-        <a:defRPr sz="1800" kern="1200">
+      <a:lvl4pPr marL="555361" algn="l" defTabSz="370241" rtl="0" eaLnBrk="1" latinLnBrk="0" hangingPunct="1">
+        <a:defRPr sz="729" kern="1200">
           <a:solidFill>
             <a:schemeClr val="tx1"/>
           </a:solidFill>
@@ -3250,8 +2896,8 @@
           <a:cs typeface="+mn-cs"/>
         </a:defRPr>
       </a:lvl4pPr>
-      <a:lvl5pPr marL="1828800" algn="l" defTabSz="914400" rtl="0" eaLnBrk="1" latinLnBrk="0" hangingPunct="1">
-        <a:defRPr sz="1800" kern="1200">
+      <a:lvl5pPr marL="740481" algn="l" defTabSz="370241" rtl="0" eaLnBrk="1" latinLnBrk="0" hangingPunct="1">
+        <a:defRPr sz="729" kern="1200">
           <a:solidFill>
             <a:schemeClr val="tx1"/>
           </a:solidFill>
@@ -3260,8 +2906,8 @@
           <a:cs typeface="+mn-cs"/>
         </a:defRPr>
       </a:lvl5pPr>
-      <a:lvl6pPr marL="2286000" algn="l" defTabSz="914400" rtl="0" eaLnBrk="1" latinLnBrk="0" hangingPunct="1">
-        <a:defRPr sz="1800" kern="1200">
+      <a:lvl6pPr marL="925601" algn="l" defTabSz="370241" rtl="0" eaLnBrk="1" latinLnBrk="0" hangingPunct="1">
+        <a:defRPr sz="729" kern="1200">
           <a:solidFill>
             <a:schemeClr val="tx1"/>
           </a:solidFill>
@@ -3270,8 +2916,8 @@
           <a:cs typeface="+mn-cs"/>
         </a:defRPr>
       </a:lvl6pPr>
-      <a:lvl7pPr marL="2743200" algn="l" defTabSz="914400" rtl="0" eaLnBrk="1" latinLnBrk="0" hangingPunct="1">
-        <a:defRPr sz="1800" kern="1200">
+      <a:lvl7pPr marL="1110722" algn="l" defTabSz="370241" rtl="0" eaLnBrk="1" latinLnBrk="0" hangingPunct="1">
+        <a:defRPr sz="729" kern="1200">
           <a:solidFill>
             <a:schemeClr val="tx1"/>
           </a:solidFill>
@@ -3280,8 +2926,8 @@
           <a:cs typeface="+mn-cs"/>
         </a:defRPr>
       </a:lvl7pPr>
-      <a:lvl8pPr marL="3200400" algn="l" defTabSz="914400" rtl="0" eaLnBrk="1" latinLnBrk="0" hangingPunct="1">
-        <a:defRPr sz="1800" kern="1200">
+      <a:lvl8pPr marL="1295842" algn="l" defTabSz="370241" rtl="0" eaLnBrk="1" latinLnBrk="0" hangingPunct="1">
+        <a:defRPr sz="729" kern="1200">
           <a:solidFill>
             <a:schemeClr val="tx1"/>
           </a:solidFill>
@@ -3290,8 +2936,8 @@
           <a:cs typeface="+mn-cs"/>
         </a:defRPr>
       </a:lvl8pPr>
-      <a:lvl9pPr marL="3657600" algn="l" defTabSz="914400" rtl="0" eaLnBrk="1" latinLnBrk="0" hangingPunct="1">
-        <a:defRPr sz="1800" kern="1200">
+      <a:lvl9pPr marL="1480962" algn="l" defTabSz="370241" rtl="0" eaLnBrk="1" latinLnBrk="0" hangingPunct="1">
+        <a:defRPr sz="729" kern="1200">
           <a:solidFill>
             <a:schemeClr val="tx1"/>
           </a:solidFill>
@@ -3306,86 +2952,6 @@
 </file>
 
 <file path=ppt/slides/slide1.xml><?xml version="1.0" encoding="utf-8"?>
-<p:sld xmlns:a="http://schemas.openxmlformats.org/drawingml/2006/main" xmlns:r="http://schemas.openxmlformats.org/officeDocument/2006/relationships" xmlns:p="http://schemas.openxmlformats.org/presentationml/2006/main">
-  <p:cSld>
-    <p:spTree>
-      <p:nvGrpSpPr>
-        <p:cNvPr id="1" name=""/>
-        <p:cNvGrpSpPr/>
-        <p:nvPr/>
-      </p:nvGrpSpPr>
-      <p:grpSpPr>
-        <a:xfrm>
-          <a:off x="0" y="0"/>
-          <a:ext cx="0" cy="0"/>
-          <a:chOff x="0" y="0"/>
-          <a:chExt cx="0" cy="0"/>
-        </a:xfrm>
-      </p:grpSpPr>
-      <p:sp>
-        <p:nvSpPr>
-          <p:cNvPr id="2" name="Title 1">
-            <a:extLst>
-              <a:ext uri="{FF2B5EF4-FFF2-40B4-BE49-F238E27FC236}">
-                <a16:creationId xmlns:a16="http://schemas.microsoft.com/office/drawing/2014/main" id="{8438F19F-E73E-E404-5DE7-7FC88F6AB578}"/>
-              </a:ext>
-            </a:extLst>
-          </p:cNvPr>
-          <p:cNvSpPr>
-            <a:spLocks noGrp="1"/>
-          </p:cNvSpPr>
-          <p:nvPr>
-            <p:ph type="ctrTitle"/>
-          </p:nvPr>
-        </p:nvSpPr>
-        <p:spPr/>
-        <p:txBody>
-          <a:bodyPr/>
-          <a:lstStyle/>
-          <a:p>
-            <a:endParaRPr lang="en-US"/>
-          </a:p>
-        </p:txBody>
-      </p:sp>
-      <p:sp>
-        <p:nvSpPr>
-          <p:cNvPr id="3" name="Subtitle 2">
-            <a:extLst>
-              <a:ext uri="{FF2B5EF4-FFF2-40B4-BE49-F238E27FC236}">
-                <a16:creationId xmlns:a16="http://schemas.microsoft.com/office/drawing/2014/main" id="{E83D6F5C-8023-E84D-7614-D187E7C67E8E}"/>
-              </a:ext>
-            </a:extLst>
-          </p:cNvPr>
-          <p:cNvSpPr>
-            <a:spLocks noGrp="1"/>
-          </p:cNvSpPr>
-          <p:nvPr>
-            <p:ph type="subTitle" idx="1"/>
-          </p:nvPr>
-        </p:nvSpPr>
-        <p:spPr/>
-        <p:txBody>
-          <a:bodyPr/>
-          <a:lstStyle/>
-          <a:p>
-            <a:endParaRPr lang="en-US"/>
-          </a:p>
-        </p:txBody>
-      </p:sp>
-    </p:spTree>
-    <p:extLst>
-      <p:ext uri="{BB962C8B-B14F-4D97-AF65-F5344CB8AC3E}">
-        <p14:creationId xmlns:p14="http://schemas.microsoft.com/office/powerpoint/2010/main" val="665567408"/>
-      </p:ext>
-    </p:extLst>
-  </p:cSld>
-  <p:clrMapOvr>
-    <a:masterClrMapping/>
-  </p:clrMapOvr>
-</p:sld>
-</file>
-
-<file path=ppt/slides/slide2.xml><?xml version="1.0" encoding="utf-8"?>
 <p:sld xmlns:a="http://schemas.openxmlformats.org/drawingml/2006/main" xmlns:r="http://schemas.openxmlformats.org/officeDocument/2006/relationships" xmlns:p="http://schemas.openxmlformats.org/presentationml/2006/main">
   <p:cSld>
     <p:spTree>
@@ -3430,8 +2996,8 @@
         </p:blipFill>
         <p:spPr>
           <a:xfrm>
-            <a:off x="1106555" y="655982"/>
-            <a:ext cx="5956854" cy="5956854"/>
+            <a:off x="-567851" y="-380355"/>
+            <a:ext cx="3718074" cy="3718074"/>
           </a:xfrm>
           <a:prstGeom prst="rect">
             <a:avLst/>
@@ -3466,8 +3032,8 @@
         </p:blipFill>
         <p:spPr>
           <a:xfrm>
-            <a:off x="6149007" y="5435874"/>
-            <a:ext cx="457201" cy="457201"/>
+            <a:off x="2547893" y="2499589"/>
+            <a:ext cx="373738" cy="373738"/>
           </a:xfrm>
           <a:prstGeom prst="rect">
             <a:avLst/>
@@ -3502,8 +3068,8 @@
         </p:blipFill>
         <p:spPr>
           <a:xfrm>
-            <a:off x="6300994" y="5049904"/>
-            <a:ext cx="457201" cy="457201"/>
+            <a:off x="2672134" y="2184079"/>
+            <a:ext cx="373738" cy="373738"/>
           </a:xfrm>
           <a:prstGeom prst="rect">
             <a:avLst/>
@@ -3538,8 +3104,8 @@
         </p:blipFill>
         <p:spPr>
           <a:xfrm>
-            <a:off x="5847520" y="5221356"/>
-            <a:ext cx="457201" cy="457201"/>
+            <a:off x="2301443" y="2324232"/>
+            <a:ext cx="373738" cy="373738"/>
           </a:xfrm>
           <a:prstGeom prst="rect">
             <a:avLst/>
@@ -3574,8 +3140,8 @@
         </p:blipFill>
         <p:spPr>
           <a:xfrm>
-            <a:off x="6598754" y="5278506"/>
-            <a:ext cx="457201" cy="457201"/>
+            <a:off x="2915538" y="2370949"/>
+            <a:ext cx="373738" cy="373738"/>
           </a:xfrm>
           <a:prstGeom prst="rect">
             <a:avLst/>
@@ -3596,8 +3162,8 @@
         </p:nvSpPr>
         <p:spPr>
           <a:xfrm>
-            <a:off x="5956851" y="3238341"/>
-            <a:ext cx="3988905" cy="1569660"/>
+            <a:off x="3228963" y="628074"/>
+            <a:ext cx="1032856" cy="696216"/>
           </a:xfrm>
           <a:prstGeom prst="rect">
             <a:avLst/>
@@ -3611,18 +3177,18 @@
           <a:lstStyle/>
           <a:p>
             <a:r>
-              <a:rPr lang="en-US" sz="4800" b="1" dirty="0">
+              <a:rPr lang="en-US" sz="3924" b="1" dirty="0">
                 <a:solidFill>
                   <a:schemeClr val="tx1">
                     <a:lumMod val="95000"/>
                     <a:lumOff val="5000"/>
                   </a:schemeClr>
                 </a:solidFill>
-                <a:latin typeface="Nordique Inline" panose="020F0502020204030204" pitchFamily="2" charset="0"/>
+                <a:latin typeface="Cooper Black" panose="0208090404030B020404" pitchFamily="18" charset="0"/>
                 <a:ea typeface="ADLaM Display" panose="020F0502020204030204" pitchFamily="2" charset="0"/>
                 <a:cs typeface="ADLaM Display" panose="020F0502020204030204" pitchFamily="2" charset="0"/>
               </a:rPr>
-              <a:t>Work in Progress</a:t>
+              <a:t>in</a:t>
             </a:r>
           </a:p>
         </p:txBody>
@@ -3655,8 +3221,8 @@
         </p:blipFill>
         <p:spPr>
           <a:xfrm>
-            <a:off x="6918463" y="5435253"/>
-            <a:ext cx="457201" cy="457201"/>
+            <a:off x="3176883" y="2499082"/>
+            <a:ext cx="373738" cy="373738"/>
           </a:xfrm>
           <a:prstGeom prst="rect">
             <a:avLst/>
@@ -3691,8 +3257,8 @@
         </p:blipFill>
         <p:spPr>
           <a:xfrm>
-            <a:off x="7108961" y="5049903"/>
-            <a:ext cx="457201" cy="457201"/>
+            <a:off x="3355689" y="2154670"/>
+            <a:ext cx="373738" cy="373738"/>
           </a:xfrm>
           <a:prstGeom prst="rect">
             <a:avLst/>
@@ -3727,8 +3293,8 @@
         </p:blipFill>
         <p:spPr>
           <a:xfrm>
-            <a:off x="6674953" y="4808053"/>
-            <a:ext cx="457201" cy="457201"/>
+            <a:off x="2977826" y="1986378"/>
+            <a:ext cx="373738" cy="373738"/>
           </a:xfrm>
           <a:prstGeom prst="rect">
             <a:avLst/>
@@ -3763,8 +3329,281 @@
         </p:blipFill>
         <p:spPr>
           <a:xfrm>
-            <a:off x="7421216" y="5363402"/>
-            <a:ext cx="457201" cy="457201"/>
+            <a:off x="3587857" y="2440347"/>
+            <a:ext cx="373738" cy="373738"/>
+          </a:xfrm>
+          <a:prstGeom prst="rect">
+            <a:avLst/>
+          </a:prstGeom>
+        </p:spPr>
+      </p:pic>
+      <p:sp>
+        <p:nvSpPr>
+          <p:cNvPr id="15" name="TextBox 14">
+            <a:extLst>
+              <a:ext uri="{FF2B5EF4-FFF2-40B4-BE49-F238E27FC236}">
+                <a16:creationId xmlns:a16="http://schemas.microsoft.com/office/drawing/2014/main" id="{14A047DB-C8F5-9FCF-E929-55D3B2CA21F4}"/>
+              </a:ext>
+            </a:extLst>
+          </p:cNvPr>
+          <p:cNvSpPr txBox="1"/>
+          <p:nvPr/>
+        </p:nvSpPr>
+        <p:spPr>
+          <a:xfrm>
+            <a:off x="2344098" y="85332"/>
+            <a:ext cx="2361585" cy="696216"/>
+          </a:xfrm>
+          <a:prstGeom prst="rect">
+            <a:avLst/>
+          </a:prstGeom>
+          <a:noFill/>
+        </p:spPr>
+        <p:txBody>
+          <a:bodyPr wrap="square">
+            <a:spAutoFit/>
+          </a:bodyPr>
+          <a:lstStyle/>
+          <a:p>
+            <a:r>
+              <a:rPr lang="en-US" sz="3924" b="1" dirty="0">
+                <a:solidFill>
+                  <a:schemeClr val="tx1">
+                    <a:lumMod val="95000"/>
+                    <a:lumOff val="5000"/>
+                  </a:schemeClr>
+                </a:solidFill>
+                <a:latin typeface="Cooper Black" panose="0208090404030B020404" pitchFamily="18" charset="0"/>
+                <a:ea typeface="ADLaM Display" panose="020F0502020204030204" pitchFamily="2" charset="0"/>
+                <a:cs typeface="ADLaM Display" panose="020F0502020204030204" pitchFamily="2" charset="0"/>
+              </a:rPr>
+              <a:t>Work</a:t>
+            </a:r>
+          </a:p>
+        </p:txBody>
+      </p:sp>
+      <p:sp>
+        <p:nvSpPr>
+          <p:cNvPr id="17" name="TextBox 16">
+            <a:extLst>
+              <a:ext uri="{FF2B5EF4-FFF2-40B4-BE49-F238E27FC236}">
+                <a16:creationId xmlns:a16="http://schemas.microsoft.com/office/drawing/2014/main" id="{207C24C0-1AEF-4732-EB3D-398C6BEEB1A3}"/>
+              </a:ext>
+            </a:extLst>
+          </p:cNvPr>
+          <p:cNvSpPr txBox="1"/>
+          <p:nvPr/>
+        </p:nvSpPr>
+        <p:spPr>
+          <a:xfrm>
+            <a:off x="2515011" y="1160811"/>
+            <a:ext cx="2507832" cy="696216"/>
+          </a:xfrm>
+          <a:prstGeom prst="rect">
+            <a:avLst/>
+          </a:prstGeom>
+          <a:noFill/>
+        </p:spPr>
+        <p:txBody>
+          <a:bodyPr wrap="square">
+            <a:spAutoFit/>
+          </a:bodyPr>
+          <a:lstStyle/>
+          <a:p>
+            <a:r>
+              <a:rPr lang="en-US" sz="3924" b="1" dirty="0">
+                <a:solidFill>
+                  <a:schemeClr val="tx1">
+                    <a:lumMod val="95000"/>
+                    <a:lumOff val="5000"/>
+                  </a:schemeClr>
+                </a:solidFill>
+                <a:latin typeface="Cooper Black" panose="0208090404030B020404" pitchFamily="18" charset="0"/>
+                <a:ea typeface="ADLaM Display" panose="020F0502020204030204" pitchFamily="2" charset="0"/>
+                <a:cs typeface="ADLaM Display" panose="020F0502020204030204" pitchFamily="2" charset="0"/>
+              </a:rPr>
+              <a:t>Progress</a:t>
+            </a:r>
+            <a:endParaRPr lang="en-US" sz="3924" dirty="0">
+              <a:latin typeface="Cooper Black" panose="0208090404030B020404" pitchFamily="18" charset="0"/>
+            </a:endParaRPr>
+          </a:p>
+        </p:txBody>
+      </p:sp>
+      <p:pic>
+        <p:nvPicPr>
+          <p:cNvPr id="18" name="Graphic 17" descr="Acorn with solid fill">
+            <a:extLst>
+              <a:ext uri="{FF2B5EF4-FFF2-40B4-BE49-F238E27FC236}">
+                <a16:creationId xmlns:a16="http://schemas.microsoft.com/office/drawing/2014/main" id="{BA3B9A97-8E02-553B-FB83-24FD09E4D90E}"/>
+              </a:ext>
+            </a:extLst>
+          </p:cNvPr>
+          <p:cNvPicPr>
+            <a:picLocks noChangeAspect="1"/>
+          </p:cNvPicPr>
+          <p:nvPr/>
+        </p:nvPicPr>
+        <p:blipFill>
+          <a:blip r:embed="rId4">
+            <a:extLst>
+              <a:ext uri="{96DAC541-7B7A-43D3-8B79-37D633B846F1}">
+                <asvg:svgBlip xmlns:asvg="http://schemas.microsoft.com/office/drawing/2016/SVG/main" r:embed="rId5"/>
+              </a:ext>
+            </a:extLst>
+          </a:blip>
+          <a:stretch>
+            <a:fillRect/>
+          </a:stretch>
+        </p:blipFill>
+        <p:spPr>
+          <a:xfrm>
+            <a:off x="3974198" y="2381100"/>
+            <a:ext cx="373738" cy="373738"/>
+          </a:xfrm>
+          <a:prstGeom prst="rect">
+            <a:avLst/>
+          </a:prstGeom>
+        </p:spPr>
+      </p:pic>
+      <p:pic>
+        <p:nvPicPr>
+          <p:cNvPr id="19" name="Graphic 18" descr="Acorn with solid fill">
+            <a:extLst>
+              <a:ext uri="{FF2B5EF4-FFF2-40B4-BE49-F238E27FC236}">
+                <a16:creationId xmlns:a16="http://schemas.microsoft.com/office/drawing/2014/main" id="{52672A47-8A98-457F-A130-91F2590775C2}"/>
+              </a:ext>
+            </a:extLst>
+          </p:cNvPr>
+          <p:cNvPicPr>
+            <a:picLocks noChangeAspect="1"/>
+          </p:cNvPicPr>
+          <p:nvPr/>
+        </p:nvPicPr>
+        <p:blipFill>
+          <a:blip r:embed="rId4">
+            <a:extLst>
+              <a:ext uri="{96DAC541-7B7A-43D3-8B79-37D633B846F1}">
+                <asvg:svgBlip xmlns:asvg="http://schemas.microsoft.com/office/drawing/2016/SVG/main" r:embed="rId5"/>
+              </a:ext>
+            </a:extLst>
+          </a:blip>
+          <a:stretch>
+            <a:fillRect/>
+          </a:stretch>
+        </p:blipFill>
+        <p:spPr>
+          <a:xfrm>
+            <a:off x="3768927" y="2086700"/>
+            <a:ext cx="373738" cy="373738"/>
+          </a:xfrm>
+          <a:prstGeom prst="rect">
+            <a:avLst/>
+          </a:prstGeom>
+        </p:spPr>
+      </p:pic>
+      <p:pic>
+        <p:nvPicPr>
+          <p:cNvPr id="20" name="Graphic 19" descr="Acorn with solid fill">
+            <a:extLst>
+              <a:ext uri="{FF2B5EF4-FFF2-40B4-BE49-F238E27FC236}">
+                <a16:creationId xmlns:a16="http://schemas.microsoft.com/office/drawing/2014/main" id="{0DE219F4-527B-6B98-D946-A4DD545920F4}"/>
+              </a:ext>
+            </a:extLst>
+          </p:cNvPr>
+          <p:cNvPicPr>
+            <a:picLocks noChangeAspect="1"/>
+          </p:cNvPicPr>
+          <p:nvPr/>
+        </p:nvPicPr>
+        <p:blipFill>
+          <a:blip r:embed="rId4">
+            <a:extLst>
+              <a:ext uri="{96DAC541-7B7A-43D3-8B79-37D633B846F1}">
+                <asvg:svgBlip xmlns:asvg="http://schemas.microsoft.com/office/drawing/2016/SVG/main" r:embed="rId5"/>
+              </a:ext>
+            </a:extLst>
+          </a:blip>
+          <a:stretch>
+            <a:fillRect/>
+          </a:stretch>
+        </p:blipFill>
+        <p:spPr>
+          <a:xfrm>
+            <a:off x="3395065" y="1810257"/>
+            <a:ext cx="373738" cy="373738"/>
+          </a:xfrm>
+          <a:prstGeom prst="rect">
+            <a:avLst/>
+          </a:prstGeom>
+        </p:spPr>
+      </p:pic>
+      <p:pic>
+        <p:nvPicPr>
+          <p:cNvPr id="21" name="Graphic 20" descr="Acorn with solid fill">
+            <a:extLst>
+              <a:ext uri="{FF2B5EF4-FFF2-40B4-BE49-F238E27FC236}">
+                <a16:creationId xmlns:a16="http://schemas.microsoft.com/office/drawing/2014/main" id="{167C8344-AF1A-1846-7A7F-9F9336A993EE}"/>
+              </a:ext>
+            </a:extLst>
+          </p:cNvPr>
+          <p:cNvPicPr>
+            <a:picLocks noChangeAspect="1"/>
+          </p:cNvPicPr>
+          <p:nvPr/>
+        </p:nvPicPr>
+        <p:blipFill>
+          <a:blip r:embed="rId4">
+            <a:extLst>
+              <a:ext uri="{96DAC541-7B7A-43D3-8B79-37D633B846F1}">
+                <asvg:svgBlip xmlns:asvg="http://schemas.microsoft.com/office/drawing/2016/SVG/main" r:embed="rId5"/>
+              </a:ext>
+            </a:extLst>
+          </a:blip>
+          <a:stretch>
+            <a:fillRect/>
+          </a:stretch>
+        </p:blipFill>
+        <p:spPr>
+          <a:xfrm>
+            <a:off x="4229450" y="2137363"/>
+            <a:ext cx="373738" cy="373738"/>
+          </a:xfrm>
+          <a:prstGeom prst="rect">
+            <a:avLst/>
+          </a:prstGeom>
+        </p:spPr>
+      </p:pic>
+      <p:pic>
+        <p:nvPicPr>
+          <p:cNvPr id="22" name="Graphic 21" descr="Acorn with solid fill">
+            <a:extLst>
+              <a:ext uri="{FF2B5EF4-FFF2-40B4-BE49-F238E27FC236}">
+                <a16:creationId xmlns:a16="http://schemas.microsoft.com/office/drawing/2014/main" id="{20EEA1B0-B40C-74BB-BEC1-282E81704B9E}"/>
+              </a:ext>
+            </a:extLst>
+          </p:cNvPr>
+          <p:cNvPicPr>
+            <a:picLocks noChangeAspect="1"/>
+          </p:cNvPicPr>
+          <p:nvPr/>
+        </p:nvPicPr>
+        <p:blipFill>
+          <a:blip r:embed="rId4">
+            <a:extLst>
+              <a:ext uri="{96DAC541-7B7A-43D3-8B79-37D633B846F1}">
+                <asvg:svgBlip xmlns:asvg="http://schemas.microsoft.com/office/drawing/2016/SVG/main" r:embed="rId5"/>
+              </a:ext>
+            </a:extLst>
+          </a:blip>
+          <a:stretch>
+            <a:fillRect/>
+          </a:stretch>
+        </p:blipFill>
+        <p:spPr>
+          <a:xfrm>
+            <a:off x="4316235" y="2489890"/>
+            <a:ext cx="373738" cy="373738"/>
           </a:xfrm>
           <a:prstGeom prst="rect">
             <a:avLst/>
@@ -3787,7 +3626,7 @@
 <file path=ppt/theme/theme1.xml><?xml version="1.0" encoding="utf-8"?>
 <a:theme xmlns:a="http://schemas.openxmlformats.org/drawingml/2006/main" name="Office Theme">
   <a:themeElements>
-    <a:clrScheme name="Office">
+    <a:clrScheme name="Office Theme">
       <a:dk1>
         <a:sysClr val="windowText" lastClr="000000"/>
       </a:dk1>
@@ -3825,7 +3664,7 @@
         <a:srgbClr val="96607D"/>
       </a:folHlink>
     </a:clrScheme>
-    <a:fontScheme name="Office">
+    <a:fontScheme name="Office Theme">
       <a:majorFont>
         <a:latin typeface="Aptos Display" panose="02110004020202020204"/>
         <a:ea typeface=""/>
@@ -3931,7 +3770,7 @@
         <a:font script="Tfng" typeface="Ebrima"/>
       </a:minorFont>
     </a:fontScheme>
-    <a:fmtScheme name="Office">
+    <a:fmtScheme name="Office Theme">
       <a:fillStyleLst>
         <a:solidFill>
           <a:schemeClr val="phClr"/>

</xml_diff>